<commit_message>
pptx updates for VHC
</commit_message>
<xml_diff>
--- a/Solutions/ppt/Vantage Health Check On a Page.pptx
+++ b/Solutions/ppt/Vantage Health Check On a Page.pptx
@@ -522,7 +522,7 @@
               <a:rPr lang="en-US" smtClean="0">
                 <a:latin typeface="Arial Regular"/>
               </a:rPr>
-              <a:t>10/19/21</a:t>
+              <a:t>12/21/21</a:t>
             </a:fld>
             <a:endParaRPr lang="en-US">
               <a:latin typeface="Arial Regular"/>
@@ -712,7 +712,7 @@
             <a:fld id="{C7103FDF-5845-2441-8890-D723FF5A85D0}" type="datetimeFigureOut">
               <a:rPr lang="en-US" smtClean="0"/>
               <a:pPr/>
-              <a:t>10/19/21</a:t>
+              <a:t>12/21/21</a:t>
             </a:fld>
             <a:endParaRPr lang="en-US"/>
           </a:p>
@@ -6288,56 +6288,6 @@
       </p:sp>
       <p:sp>
         <p:nvSpPr>
-          <p:cNvPr id="90" name="TextBox 89">
-            <a:extLst>
-              <a:ext uri="{FF2B5EF4-FFF2-40B4-BE49-F238E27FC236}">
-                <a16:creationId xmlns:a16="http://schemas.microsoft.com/office/drawing/2014/main" id="{B4038997-2C89-4408-A84E-D8F30FD435B7}"/>
-              </a:ext>
-            </a:extLst>
-          </p:cNvPr>
-          <p:cNvSpPr txBox="1"/>
-          <p:nvPr/>
-        </p:nvSpPr>
-        <p:spPr>
-          <a:xfrm>
-            <a:off x="6480624" y="1464281"/>
-            <a:ext cx="4311252" cy="169277"/>
-          </a:xfrm>
-          <a:prstGeom prst="rect">
-            <a:avLst/>
-          </a:prstGeom>
-          <a:noFill/>
-        </p:spPr>
-        <p:txBody>
-          <a:bodyPr wrap="none" lIns="0" tIns="0" rIns="0" bIns="0" rtlCol="0" anchor="ctr" anchorCtr="0">
-            <a:spAutoFit/>
-          </a:bodyPr>
-          <a:lstStyle>
-            <a:defPPr>
-              <a:defRPr lang="en-US"/>
-            </a:defPPr>
-            <a:lvl1pPr>
-              <a:defRPr sz="1200" b="1"/>
-            </a:lvl1pPr>
-          </a:lstStyle>
-          <a:p>
-            <a:r>
-              <a:rPr lang="en-US" dirty="0"/>
-              <a:t>{{</a:t>
-            </a:r>
-            <a:r>
-              <a:rPr lang="en-US" dirty="0" err="1"/>
-              <a:t>val:oap</a:t>
-            </a:r>
-            <a:r>
-              <a:rPr lang="en-US" dirty="0"/>
-              <a:t>--dbcinfo.csv[3:2]}}</a:t>
-            </a:r>
-          </a:p>
-        </p:txBody>
-      </p:sp>
-      <p:sp>
-        <p:nvSpPr>
           <p:cNvPr id="91" name="TextBox 90">
             <a:extLst>
               <a:ext uri="{FF2B5EF4-FFF2-40B4-BE49-F238E27FC236}">
@@ -6375,56 +6325,6 @@
             <a:r>
               <a:rPr lang="en-US" sz="1200" b="1" dirty="0"/>
               <a:t>:  </a:t>
-            </a:r>
-          </a:p>
-        </p:txBody>
-      </p:sp>
-      <p:sp>
-        <p:nvSpPr>
-          <p:cNvPr id="92" name="TextBox 91">
-            <a:extLst>
-              <a:ext uri="{FF2B5EF4-FFF2-40B4-BE49-F238E27FC236}">
-                <a16:creationId xmlns:a16="http://schemas.microsoft.com/office/drawing/2014/main" id="{05C9BBE1-1CEE-4596-A56E-EDD649031959}"/>
-              </a:ext>
-            </a:extLst>
-          </p:cNvPr>
-          <p:cNvSpPr txBox="1"/>
-          <p:nvPr/>
-        </p:nvSpPr>
-        <p:spPr>
-          <a:xfrm>
-            <a:off x="6467871" y="1694727"/>
-            <a:ext cx="4311252" cy="169277"/>
-          </a:xfrm>
-          <a:prstGeom prst="rect">
-            <a:avLst/>
-          </a:prstGeom>
-          <a:noFill/>
-        </p:spPr>
-        <p:txBody>
-          <a:bodyPr wrap="none" lIns="0" tIns="0" rIns="0" bIns="0" rtlCol="0" anchor="ctr" anchorCtr="0">
-            <a:spAutoFit/>
-          </a:bodyPr>
-          <a:lstStyle>
-            <a:defPPr>
-              <a:defRPr lang="en-US"/>
-            </a:defPPr>
-            <a:lvl1pPr>
-              <a:defRPr sz="1200" b="1"/>
-            </a:lvl1pPr>
-          </a:lstStyle>
-          <a:p>
-            <a:r>
-              <a:rPr lang="en-US" dirty="0"/>
-              <a:t>{{</a:t>
-            </a:r>
-            <a:r>
-              <a:rPr lang="en-US" dirty="0" err="1"/>
-              <a:t>val:oap</a:t>
-            </a:r>
-            <a:r>
-              <a:rPr lang="en-US" dirty="0"/>
-              <a:t>--dbcinfo.csv[4:2]}}</a:t>
             </a:r>
           </a:p>
         </p:txBody>
@@ -6474,56 +6374,6 @@
       </p:sp>
       <p:sp>
         <p:nvSpPr>
-          <p:cNvPr id="94" name="TextBox 93">
-            <a:extLst>
-              <a:ext uri="{FF2B5EF4-FFF2-40B4-BE49-F238E27FC236}">
-                <a16:creationId xmlns:a16="http://schemas.microsoft.com/office/drawing/2014/main" id="{319D8A66-F0EA-4E8F-AA13-63EC083E5732}"/>
-              </a:ext>
-            </a:extLst>
-          </p:cNvPr>
-          <p:cNvSpPr txBox="1"/>
-          <p:nvPr/>
-        </p:nvSpPr>
-        <p:spPr>
-          <a:xfrm>
-            <a:off x="6463518" y="1928684"/>
-            <a:ext cx="4311252" cy="184666"/>
-          </a:xfrm>
-          <a:prstGeom prst="rect">
-            <a:avLst/>
-          </a:prstGeom>
-          <a:noFill/>
-        </p:spPr>
-        <p:txBody>
-          <a:bodyPr wrap="none" lIns="0" tIns="0" rIns="0" bIns="0" rtlCol="0" anchor="ctr" anchorCtr="0">
-            <a:spAutoFit/>
-          </a:bodyPr>
-          <a:lstStyle>
-            <a:defPPr>
-              <a:defRPr lang="en-US"/>
-            </a:defPPr>
-            <a:lvl1pPr>
-              <a:defRPr sz="1200" b="1"/>
-            </a:lvl1pPr>
-          </a:lstStyle>
-          <a:p>
-            <a:r>
-              <a:rPr lang="en-US" dirty="0"/>
-              <a:t>{{</a:t>
-            </a:r>
-            <a:r>
-              <a:rPr lang="en-US" dirty="0" err="1"/>
-              <a:t>val:oap</a:t>
-            </a:r>
-            <a:r>
-              <a:rPr lang="en-US" dirty="0"/>
-              <a:t>--COD.csv[2:2]}}</a:t>
-            </a:r>
-          </a:p>
-        </p:txBody>
-      </p:sp>
-      <p:sp>
-        <p:nvSpPr>
           <p:cNvPr id="74" name="TextBox 73">
             <a:extLst>
               <a:ext uri="{FF2B5EF4-FFF2-40B4-BE49-F238E27FC236}">
@@ -6553,56 +6403,6 @@
             <a:r>
               <a:rPr lang="en-US" sz="1200" b="1" dirty="0"/>
               <a:t>Version:</a:t>
-            </a:r>
-          </a:p>
-        </p:txBody>
-      </p:sp>
-      <p:sp>
-        <p:nvSpPr>
-          <p:cNvPr id="75" name="TextBox 74">
-            <a:extLst>
-              <a:ext uri="{FF2B5EF4-FFF2-40B4-BE49-F238E27FC236}">
-                <a16:creationId xmlns:a16="http://schemas.microsoft.com/office/drawing/2014/main" id="{A3F8E0F3-AD7D-4DBB-A366-65ECD64BF3B0}"/>
-              </a:ext>
-            </a:extLst>
-          </p:cNvPr>
-          <p:cNvSpPr txBox="1"/>
-          <p:nvPr/>
-        </p:nvSpPr>
-        <p:spPr>
-          <a:xfrm>
-            <a:off x="6455898" y="2389694"/>
-            <a:ext cx="4311252" cy="184666"/>
-          </a:xfrm>
-          <a:prstGeom prst="rect">
-            <a:avLst/>
-          </a:prstGeom>
-          <a:noFill/>
-        </p:spPr>
-        <p:txBody>
-          <a:bodyPr wrap="none" lIns="0" tIns="0" rIns="0" bIns="0" rtlCol="0" anchor="ctr" anchorCtr="0">
-            <a:spAutoFit/>
-          </a:bodyPr>
-          <a:lstStyle>
-            <a:defPPr>
-              <a:defRPr lang="en-US"/>
-            </a:defPPr>
-            <a:lvl1pPr>
-              <a:defRPr sz="1200" b="1"/>
-            </a:lvl1pPr>
-          </a:lstStyle>
-          <a:p>
-            <a:r>
-              <a:rPr lang="en-US" dirty="0"/>
-              <a:t>{{</a:t>
-            </a:r>
-            <a:r>
-              <a:rPr lang="en-US" dirty="0" err="1"/>
-              <a:t>val:oap</a:t>
-            </a:r>
-            <a:r>
-              <a:rPr lang="en-US" dirty="0"/>
-              <a:t>--dbcinfo.csv[5:2]}}</a:t>
             </a:r>
           </a:p>
         </p:txBody>
@@ -6638,56 +6438,6 @@
             <a:r>
               <a:rPr lang="en-US" sz="1200" b="1" dirty="0"/>
               <a:t>COD:</a:t>
-            </a:r>
-          </a:p>
-        </p:txBody>
-      </p:sp>
-      <p:sp>
-        <p:nvSpPr>
-          <p:cNvPr id="80" name="TextBox 79">
-            <a:extLst>
-              <a:ext uri="{FF2B5EF4-FFF2-40B4-BE49-F238E27FC236}">
-                <a16:creationId xmlns:a16="http://schemas.microsoft.com/office/drawing/2014/main" id="{E2A83592-0BF0-4640-A083-20A2004056CE}"/>
-              </a:ext>
-            </a:extLst>
-          </p:cNvPr>
-          <p:cNvSpPr txBox="1"/>
-          <p:nvPr/>
-        </p:nvSpPr>
-        <p:spPr>
-          <a:xfrm>
-            <a:off x="6459203" y="2634303"/>
-            <a:ext cx="4311252" cy="184666"/>
-          </a:xfrm>
-          <a:prstGeom prst="rect">
-            <a:avLst/>
-          </a:prstGeom>
-          <a:noFill/>
-        </p:spPr>
-        <p:txBody>
-          <a:bodyPr wrap="none" lIns="0" tIns="0" rIns="0" bIns="0" rtlCol="0" anchor="ctr" anchorCtr="0">
-            <a:spAutoFit/>
-          </a:bodyPr>
-          <a:lstStyle>
-            <a:defPPr>
-              <a:defRPr lang="en-US"/>
-            </a:defPPr>
-            <a:lvl1pPr>
-              <a:defRPr sz="1200" b="1"/>
-            </a:lvl1pPr>
-          </a:lstStyle>
-          <a:p>
-            <a:r>
-              <a:rPr lang="en-US" dirty="0"/>
-              <a:t>{{</a:t>
-            </a:r>
-            <a:r>
-              <a:rPr lang="en-US" dirty="0" err="1"/>
-              <a:t>val:oap</a:t>
-            </a:r>
-            <a:r>
-              <a:rPr lang="en-US" dirty="0"/>
-              <a:t>--COD.csv[3:2]}}%</a:t>
             </a:r>
           </a:p>
         </p:txBody>
@@ -6893,7 +6643,7 @@
             </a:ln>
             <a:extLst>
               <a:ext uri="{91240B29-F687-4f45-9708-019B960494DF}">
-                <a14:hiddenLine xmlns:a14="http://schemas.microsoft.com/office/drawing/2010/main" xmlns="" w="9525">
+                <a14:hiddenLine xmlns="" xmlns:a14="http://schemas.microsoft.com/office/drawing/2010/main" w="9525">
                   <a:solidFill>
                     <a:srgbClr val="000000"/>
                   </a:solidFill>
@@ -7093,7 +6843,7 @@
             </a:ln>
             <a:extLst>
               <a:ext uri="{91240B29-F687-4f45-9708-019B960494DF}">
-                <a14:hiddenLine xmlns:a14="http://schemas.microsoft.com/office/drawing/2010/main" xmlns="" w="9525">
+                <a14:hiddenLine xmlns="" xmlns:a14="http://schemas.microsoft.com/office/drawing/2010/main" w="9525">
                   <a:solidFill>
                     <a:srgbClr val="000000"/>
                   </a:solidFill>
@@ -7293,7 +7043,7 @@
             </a:ln>
             <a:extLst>
               <a:ext uri="{91240B29-F687-4f45-9708-019B960494DF}">
-                <a14:hiddenLine xmlns:a14="http://schemas.microsoft.com/office/drawing/2010/main" xmlns="" w="9525">
+                <a14:hiddenLine xmlns="" xmlns:a14="http://schemas.microsoft.com/office/drawing/2010/main" w="9525">
                   <a:solidFill>
                     <a:srgbClr val="000000"/>
                   </a:solidFill>
@@ -7533,7 +7283,7 @@
             </a:ln>
             <a:extLst>
               <a:ext uri="{91240B29-F687-4f45-9708-019B960494DF}">
-                <a14:hiddenLine xmlns:a14="http://schemas.microsoft.com/office/drawing/2010/main" xmlns="" w="9525">
+                <a14:hiddenLine xmlns="" xmlns:a14="http://schemas.microsoft.com/office/drawing/2010/main" w="9525">
                   <a:solidFill>
                     <a:srgbClr val="000000"/>
                   </a:solidFill>
@@ -9432,56 +9182,6 @@
             <a:r>
               <a:rPr lang="en-US" sz="1200" b="1" dirty="0"/>
               <a:t>:</a:t>
-            </a:r>
-          </a:p>
-        </p:txBody>
-      </p:sp>
-      <p:sp>
-        <p:nvSpPr>
-          <p:cNvPr id="84" name="TextBox 83">
-            <a:extLst>
-              <a:ext uri="{FF2B5EF4-FFF2-40B4-BE49-F238E27FC236}">
-                <a16:creationId xmlns:a16="http://schemas.microsoft.com/office/drawing/2014/main" id="{09C20783-1255-4887-846D-EC2CE6547E1E}"/>
-              </a:ext>
-            </a:extLst>
-          </p:cNvPr>
-          <p:cNvSpPr txBox="1"/>
-          <p:nvPr/>
-        </p:nvSpPr>
-        <p:spPr>
-          <a:xfrm>
-            <a:off x="6463518" y="2151043"/>
-            <a:ext cx="4311252" cy="184666"/>
-          </a:xfrm>
-          <a:prstGeom prst="rect">
-            <a:avLst/>
-          </a:prstGeom>
-          <a:noFill/>
-        </p:spPr>
-        <p:txBody>
-          <a:bodyPr wrap="none" lIns="0" tIns="0" rIns="0" bIns="0" rtlCol="0" anchor="ctr" anchorCtr="0">
-            <a:spAutoFit/>
-          </a:bodyPr>
-          <a:lstStyle>
-            <a:defPPr>
-              <a:defRPr lang="en-US"/>
-            </a:defPPr>
-            <a:lvl1pPr>
-              <a:defRPr sz="1200" b="1"/>
-            </a:lvl1pPr>
-          </a:lstStyle>
-          <a:p>
-            <a:r>
-              <a:rPr lang="en-US" dirty="0"/>
-              <a:t>{{</a:t>
-            </a:r>
-            <a:r>
-              <a:rPr lang="en-US" dirty="0" err="1"/>
-              <a:t>val:oap</a:t>
-            </a:r>
-            <a:r>
-              <a:rPr lang="en-US" dirty="0"/>
-              <a:t>--COD.csv[1:2]}}</a:t>
             </a:r>
           </a:p>
         </p:txBody>
@@ -11511,6 +11211,306 @@
             <a:r>
               <a:rPr lang="en-US" sz="1150" dirty="0"/>
               <a:t>Applications on the platform</a:t>
+            </a:r>
+          </a:p>
+        </p:txBody>
+      </p:sp>
+      <p:sp>
+        <p:nvSpPr>
+          <p:cNvPr id="90" name="TextBox 89">
+            <a:extLst>
+              <a:ext uri="{FF2B5EF4-FFF2-40B4-BE49-F238E27FC236}">
+                <a16:creationId xmlns:a16="http://schemas.microsoft.com/office/drawing/2014/main" id="{B4038997-2C89-4408-A84E-D8F30FD435B7}"/>
+              </a:ext>
+            </a:extLst>
+          </p:cNvPr>
+          <p:cNvSpPr txBox="1"/>
+          <p:nvPr/>
+        </p:nvSpPr>
+        <p:spPr>
+          <a:xfrm>
+            <a:off x="6480624" y="1464281"/>
+            <a:ext cx="4311252" cy="169277"/>
+          </a:xfrm>
+          <a:prstGeom prst="rect">
+            <a:avLst/>
+          </a:prstGeom>
+          <a:noFill/>
+        </p:spPr>
+        <p:txBody>
+          <a:bodyPr wrap="none" lIns="0" tIns="0" rIns="0" bIns="0" rtlCol="0" anchor="ctr" anchorCtr="0">
+            <a:spAutoFit/>
+          </a:bodyPr>
+          <a:lstStyle>
+            <a:defPPr>
+              <a:defRPr lang="en-US"/>
+            </a:defPPr>
+            <a:lvl1pPr>
+              <a:defRPr sz="1200" b="1"/>
+            </a:lvl1pPr>
+          </a:lstStyle>
+          <a:p>
+            <a:r>
+              <a:rPr lang="en-US" dirty="0"/>
+              <a:t>{{</a:t>
+            </a:r>
+            <a:r>
+              <a:rPr lang="en-US" dirty="0" err="1"/>
+              <a:t>val:oap</a:t>
+            </a:r>
+            <a:r>
+              <a:rPr lang="en-US" dirty="0"/>
+              <a:t>--dbcinfo.csv[3:2]}}</a:t>
+            </a:r>
+          </a:p>
+        </p:txBody>
+      </p:sp>
+      <p:sp>
+        <p:nvSpPr>
+          <p:cNvPr id="92" name="TextBox 91">
+            <a:extLst>
+              <a:ext uri="{FF2B5EF4-FFF2-40B4-BE49-F238E27FC236}">
+                <a16:creationId xmlns:a16="http://schemas.microsoft.com/office/drawing/2014/main" id="{05C9BBE1-1CEE-4596-A56E-EDD649031959}"/>
+              </a:ext>
+            </a:extLst>
+          </p:cNvPr>
+          <p:cNvSpPr txBox="1"/>
+          <p:nvPr/>
+        </p:nvSpPr>
+        <p:spPr>
+          <a:xfrm>
+            <a:off x="6467871" y="1694727"/>
+            <a:ext cx="4311252" cy="169277"/>
+          </a:xfrm>
+          <a:prstGeom prst="rect">
+            <a:avLst/>
+          </a:prstGeom>
+          <a:noFill/>
+        </p:spPr>
+        <p:txBody>
+          <a:bodyPr wrap="none" lIns="0" tIns="0" rIns="0" bIns="0" rtlCol="0" anchor="ctr" anchorCtr="0">
+            <a:spAutoFit/>
+          </a:bodyPr>
+          <a:lstStyle>
+            <a:defPPr>
+              <a:defRPr lang="en-US"/>
+            </a:defPPr>
+            <a:lvl1pPr>
+              <a:defRPr sz="1200" b="1"/>
+            </a:lvl1pPr>
+          </a:lstStyle>
+          <a:p>
+            <a:r>
+              <a:rPr lang="en-US" dirty="0"/>
+              <a:t>{{</a:t>
+            </a:r>
+            <a:r>
+              <a:rPr lang="en-US" dirty="0" err="1"/>
+              <a:t>val:oap</a:t>
+            </a:r>
+            <a:r>
+              <a:rPr lang="en-US" dirty="0"/>
+              <a:t>--dbcinfo.csv[4:2]}}</a:t>
+            </a:r>
+          </a:p>
+        </p:txBody>
+      </p:sp>
+      <p:sp>
+        <p:nvSpPr>
+          <p:cNvPr id="94" name="TextBox 93">
+            <a:extLst>
+              <a:ext uri="{FF2B5EF4-FFF2-40B4-BE49-F238E27FC236}">
+                <a16:creationId xmlns:a16="http://schemas.microsoft.com/office/drawing/2014/main" id="{319D8A66-F0EA-4E8F-AA13-63EC083E5732}"/>
+              </a:ext>
+            </a:extLst>
+          </p:cNvPr>
+          <p:cNvSpPr txBox="1"/>
+          <p:nvPr/>
+        </p:nvSpPr>
+        <p:spPr>
+          <a:xfrm>
+            <a:off x="6463518" y="1928684"/>
+            <a:ext cx="4311252" cy="184666"/>
+          </a:xfrm>
+          <a:prstGeom prst="rect">
+            <a:avLst/>
+          </a:prstGeom>
+          <a:noFill/>
+        </p:spPr>
+        <p:txBody>
+          <a:bodyPr wrap="none" lIns="0" tIns="0" rIns="0" bIns="0" rtlCol="0" anchor="ctr" anchorCtr="0">
+            <a:spAutoFit/>
+          </a:bodyPr>
+          <a:lstStyle>
+            <a:defPPr>
+              <a:defRPr lang="en-US"/>
+            </a:defPPr>
+            <a:lvl1pPr>
+              <a:defRPr sz="1200" b="1"/>
+            </a:lvl1pPr>
+          </a:lstStyle>
+          <a:p>
+            <a:r>
+              <a:rPr lang="en-US" dirty="0"/>
+              <a:t>{{</a:t>
+            </a:r>
+            <a:r>
+              <a:rPr lang="en-US" dirty="0" err="1"/>
+              <a:t>val:oap</a:t>
+            </a:r>
+            <a:r>
+              <a:rPr lang="en-US" dirty="0"/>
+              <a:t>--COD.csv[2:2]}}</a:t>
+            </a:r>
+          </a:p>
+        </p:txBody>
+      </p:sp>
+      <p:sp>
+        <p:nvSpPr>
+          <p:cNvPr id="75" name="TextBox 74">
+            <a:extLst>
+              <a:ext uri="{FF2B5EF4-FFF2-40B4-BE49-F238E27FC236}">
+                <a16:creationId xmlns:a16="http://schemas.microsoft.com/office/drawing/2014/main" id="{A3F8E0F3-AD7D-4DBB-A366-65ECD64BF3B0}"/>
+              </a:ext>
+            </a:extLst>
+          </p:cNvPr>
+          <p:cNvSpPr txBox="1"/>
+          <p:nvPr/>
+        </p:nvSpPr>
+        <p:spPr>
+          <a:xfrm>
+            <a:off x="6455898" y="2389694"/>
+            <a:ext cx="4311252" cy="184666"/>
+          </a:xfrm>
+          <a:prstGeom prst="rect">
+            <a:avLst/>
+          </a:prstGeom>
+          <a:noFill/>
+        </p:spPr>
+        <p:txBody>
+          <a:bodyPr wrap="none" lIns="0" tIns="0" rIns="0" bIns="0" rtlCol="0" anchor="ctr" anchorCtr="0">
+            <a:spAutoFit/>
+          </a:bodyPr>
+          <a:lstStyle>
+            <a:defPPr>
+              <a:defRPr lang="en-US"/>
+            </a:defPPr>
+            <a:lvl1pPr>
+              <a:defRPr sz="1200" b="1"/>
+            </a:lvl1pPr>
+          </a:lstStyle>
+          <a:p>
+            <a:r>
+              <a:rPr lang="en-US" dirty="0"/>
+              <a:t>{{</a:t>
+            </a:r>
+            <a:r>
+              <a:rPr lang="en-US" dirty="0" err="1"/>
+              <a:t>val:oap</a:t>
+            </a:r>
+            <a:r>
+              <a:rPr lang="en-US" dirty="0"/>
+              <a:t>--dbcinfo.csv[5:2]}}</a:t>
+            </a:r>
+          </a:p>
+        </p:txBody>
+      </p:sp>
+      <p:sp>
+        <p:nvSpPr>
+          <p:cNvPr id="80" name="TextBox 79">
+            <a:extLst>
+              <a:ext uri="{FF2B5EF4-FFF2-40B4-BE49-F238E27FC236}">
+                <a16:creationId xmlns:a16="http://schemas.microsoft.com/office/drawing/2014/main" id="{E2A83592-0BF0-4640-A083-20A2004056CE}"/>
+              </a:ext>
+            </a:extLst>
+          </p:cNvPr>
+          <p:cNvSpPr txBox="1"/>
+          <p:nvPr/>
+        </p:nvSpPr>
+        <p:spPr>
+          <a:xfrm>
+            <a:off x="6459203" y="2634303"/>
+            <a:ext cx="4311252" cy="184666"/>
+          </a:xfrm>
+          <a:prstGeom prst="rect">
+            <a:avLst/>
+          </a:prstGeom>
+          <a:noFill/>
+        </p:spPr>
+        <p:txBody>
+          <a:bodyPr wrap="none" lIns="0" tIns="0" rIns="0" bIns="0" rtlCol="0" anchor="ctr" anchorCtr="0">
+            <a:spAutoFit/>
+          </a:bodyPr>
+          <a:lstStyle>
+            <a:defPPr>
+              <a:defRPr lang="en-US"/>
+            </a:defPPr>
+            <a:lvl1pPr>
+              <a:defRPr sz="1200" b="1"/>
+            </a:lvl1pPr>
+          </a:lstStyle>
+          <a:p>
+            <a:r>
+              <a:rPr lang="en-US" dirty="0"/>
+              <a:t>{{</a:t>
+            </a:r>
+            <a:r>
+              <a:rPr lang="en-US" dirty="0" err="1"/>
+              <a:t>val:oap</a:t>
+            </a:r>
+            <a:r>
+              <a:rPr lang="en-US" dirty="0"/>
+              <a:t>--COD.csv[3:2]}}%</a:t>
+            </a:r>
+          </a:p>
+        </p:txBody>
+      </p:sp>
+      <p:sp>
+        <p:nvSpPr>
+          <p:cNvPr id="84" name="TextBox 83">
+            <a:extLst>
+              <a:ext uri="{FF2B5EF4-FFF2-40B4-BE49-F238E27FC236}">
+                <a16:creationId xmlns:a16="http://schemas.microsoft.com/office/drawing/2014/main" id="{09C20783-1255-4887-846D-EC2CE6547E1E}"/>
+              </a:ext>
+            </a:extLst>
+          </p:cNvPr>
+          <p:cNvSpPr txBox="1"/>
+          <p:nvPr/>
+        </p:nvSpPr>
+        <p:spPr>
+          <a:xfrm>
+            <a:off x="6463518" y="2151043"/>
+            <a:ext cx="4311252" cy="184666"/>
+          </a:xfrm>
+          <a:prstGeom prst="rect">
+            <a:avLst/>
+          </a:prstGeom>
+          <a:noFill/>
+        </p:spPr>
+        <p:txBody>
+          <a:bodyPr wrap="none" lIns="0" tIns="0" rIns="0" bIns="0" rtlCol="0" anchor="ctr" anchorCtr="0">
+            <a:spAutoFit/>
+          </a:bodyPr>
+          <a:lstStyle>
+            <a:defPPr>
+              <a:defRPr lang="en-US"/>
+            </a:defPPr>
+            <a:lvl1pPr>
+              <a:defRPr sz="1200" b="1"/>
+            </a:lvl1pPr>
+          </a:lstStyle>
+          <a:p>
+            <a:r>
+              <a:rPr lang="en-US" dirty="0"/>
+              <a:t>{{</a:t>
+            </a:r>
+            <a:r>
+              <a:rPr lang="en-US" dirty="0" err="1"/>
+              <a:t>val:oap</a:t>
+            </a:r>
+            <a:r>
+              <a:rPr lang="en-US" dirty="0"/>
+              <a:t>--COD.csv[1:2]}}</a:t>
             </a:r>
           </a:p>
         </p:txBody>
@@ -12380,6 +12380,21 @@
 </file>
 
 <file path=customXml/item1.xml><?xml version="1.0" encoding="utf-8"?>
+<p:properties xmlns:p="http://schemas.microsoft.com/office/2006/metadata/properties" xmlns:xsi="http://www.w3.org/2001/XMLSchema-instance" xmlns:pc="http://schemas.microsoft.com/office/infopath/2007/PartnerControls">
+  <documentManagement/>
+</p:properties>
+</file>
+
+<file path=customXml/item2.xml><?xml version="1.0" encoding="utf-8"?>
+<?mso-contentType ?>
+<FormTemplates xmlns="http://schemas.microsoft.com/sharepoint/v3/contenttype/forms">
+  <Display>DocumentLibraryForm</Display>
+  <Edit>DocumentLibraryForm</Edit>
+  <New>DocumentLibraryForm</New>
+</FormTemplates>
+</file>
+
+<file path=customXml/item3.xml><?xml version="1.0" encoding="utf-8"?>
 <ct:contentTypeSchema xmlns:ct="http://schemas.microsoft.com/office/2006/metadata/contentType" xmlns:ma="http://schemas.microsoft.com/office/2006/metadata/properties/metaAttributes" ct:_="" ma:_="" ma:contentTypeName="Document" ma:contentTypeID="0x0101002EB8E814A3F7584EAE8FF0B3DB852A19" ma:contentTypeVersion="9" ma:contentTypeDescription="Create a new document." ma:contentTypeScope="" ma:versionID="e69ab516aeb44ea5badcc8eb89028f65">
   <xsd:schema xmlns:xsd="http://www.w3.org/2001/XMLSchema" xmlns:xs="http://www.w3.org/2001/XMLSchema" xmlns:p="http://schemas.microsoft.com/office/2006/metadata/properties" xmlns:ns2="02124634-a52d-4e0c-b527-846138045ca7" xmlns:ns3="7d2247ee-dcae-49b5-8e6a-08fc19cc9b93" targetNamespace="http://schemas.microsoft.com/office/2006/metadata/properties" ma:root="true" ma:fieldsID="059e6346cdd3e15961f0c09961190cf6" ns2:_="" ns3:_="">
     <xsd:import namespace="02124634-a52d-4e0c-b527-846138045ca7"/>
@@ -12576,22 +12591,32 @@
 </ct:contentTypeSchema>
 </file>
 
-<file path=customXml/item2.xml><?xml version="1.0" encoding="utf-8"?>
-<?mso-contentType ?>
-<FormTemplates xmlns="http://schemas.microsoft.com/sharepoint/v3/contenttype/forms">
-  <Display>DocumentLibraryForm</Display>
-  <Edit>DocumentLibraryForm</Edit>
-  <New>DocumentLibraryForm</New>
-</FormTemplates>
+<file path=customXml/itemProps1.xml><?xml version="1.0" encoding="utf-8"?>
+<ds:datastoreItem xmlns:ds="http://schemas.openxmlformats.org/officeDocument/2006/customXml" ds:itemID="{6609DDB2-8F90-49F6-B87F-2D5D805E2FD6}">
+  <ds:schemaRefs>
+    <ds:schemaRef ds:uri="http://www.w3.org/XML/1998/namespace"/>
+    <ds:schemaRef ds:uri="http://purl.org/dc/terms/"/>
+    <ds:schemaRef ds:uri="http://schemas.microsoft.com/office/2006/metadata/properties"/>
+    <ds:schemaRef ds:uri="http://schemas.microsoft.com/office/2006/documentManagement/types"/>
+    <ds:schemaRef ds:uri="http://schemas.openxmlformats.org/package/2006/metadata/core-properties"/>
+    <ds:schemaRef ds:uri="http://schemas.microsoft.com/office/infopath/2007/PartnerControls"/>
+    <ds:schemaRef ds:uri="http://purl.org/dc/elements/1.1/"/>
+    <ds:schemaRef ds:uri="7d2247ee-dcae-49b5-8e6a-08fc19cc9b93"/>
+    <ds:schemaRef ds:uri="02124634-a52d-4e0c-b527-846138045ca7"/>
+    <ds:schemaRef ds:uri="http://purl.org/dc/dcmitype/"/>
+  </ds:schemaRefs>
+</ds:datastoreItem>
 </file>
 
-<file path=customXml/item3.xml><?xml version="1.0" encoding="utf-8"?>
-<p:properties xmlns:p="http://schemas.microsoft.com/office/2006/metadata/properties" xmlns:xsi="http://www.w3.org/2001/XMLSchema-instance" xmlns:pc="http://schemas.microsoft.com/office/infopath/2007/PartnerControls">
-  <documentManagement/>
-</p:properties>
+<file path=customXml/itemProps2.xml><?xml version="1.0" encoding="utf-8"?>
+<ds:datastoreItem xmlns:ds="http://schemas.openxmlformats.org/officeDocument/2006/customXml" ds:itemID="{D278F648-E670-4262-A352-AA37A92B1414}">
+  <ds:schemaRefs>
+    <ds:schemaRef ds:uri="http://schemas.microsoft.com/sharepoint/v3/contenttype/forms"/>
+  </ds:schemaRefs>
+</ds:datastoreItem>
 </file>
 
-<file path=customXml/itemProps1.xml><?xml version="1.0" encoding="utf-8"?>
+<file path=customXml/itemProps3.xml><?xml version="1.0" encoding="utf-8"?>
 <ds:datastoreItem xmlns:ds="http://schemas.openxmlformats.org/officeDocument/2006/customXml" ds:itemID="{3B0D08CB-7837-46C6-8BCF-D192649CEE8A}">
   <ds:schemaRefs>
     <ds:schemaRef ds:uri="http://schemas.microsoft.com/office/2006/metadata/contentType"/>
@@ -12608,29 +12633,4 @@
     <ds:schemaRef ds:uri="http://schemas.microsoft.com/internal/obd"/>
   </ds:schemaRefs>
 </ds:datastoreItem>
-</file>
-
-<file path=customXml/itemProps2.xml><?xml version="1.0" encoding="utf-8"?>
-<ds:datastoreItem xmlns:ds="http://schemas.openxmlformats.org/officeDocument/2006/customXml" ds:itemID="{D278F648-E670-4262-A352-AA37A92B1414}">
-  <ds:schemaRefs>
-    <ds:schemaRef ds:uri="http://schemas.microsoft.com/sharepoint/v3/contenttype/forms"/>
-  </ds:schemaRefs>
-</ds:datastoreItem>
-</file>
-
-<file path=customXml/itemProps3.xml><?xml version="1.0" encoding="utf-8"?>
-<ds:datastoreItem xmlns:ds="http://schemas.openxmlformats.org/officeDocument/2006/customXml" ds:itemID="{6609DDB2-8F90-49F6-B87F-2D5D805E2FD6}">
-  <ds:schemaRefs>
-    <ds:schemaRef ds:uri="http://www.w3.org/XML/1998/namespace"/>
-    <ds:schemaRef ds:uri="http://purl.org/dc/terms/"/>
-    <ds:schemaRef ds:uri="http://schemas.microsoft.com/office/2006/metadata/properties"/>
-    <ds:schemaRef ds:uri="http://schemas.microsoft.com/office/2006/documentManagement/types"/>
-    <ds:schemaRef ds:uri="http://schemas.openxmlformats.org/package/2006/metadata/core-properties"/>
-    <ds:schemaRef ds:uri="http://schemas.microsoft.com/office/infopath/2007/PartnerControls"/>
-    <ds:schemaRef ds:uri="http://purl.org/dc/elements/1.1/"/>
-    <ds:schemaRef ds:uri="7d2247ee-dcae-49b5-8e6a-08fc19cc9b93"/>
-    <ds:schemaRef ds:uri="02124634-a52d-4e0c-b527-846138045ca7"/>
-    <ds:schemaRef ds:uri="http://purl.org/dc/dcmitype/"/>
-  </ds:schemaRefs>
-</ds:datastoreItem>
 </file>
</xml_diff>

<commit_message>
Update to VHC 4.1
</commit_message>
<xml_diff>
--- a/Solutions/ppt/Vantage Health Check On a Page.pptx
+++ b/Solutions/ppt/Vantage Health Check On a Page.pptx
@@ -11,7 +11,7 @@
     <p:handoutMasterId r:id="rId7"/>
   </p:handoutMasterIdLst>
   <p:sldIdLst>
-    <p:sldId id="376" r:id="rId5"/>
+    <p:sldId id="2142532933" r:id="rId5"/>
   </p:sldIdLst>
   <p:sldSz cx="12192000" cy="6858000"/>
   <p:notesSz cx="6858000" cy="2409825"/>
@@ -522,7 +522,7 @@
               <a:rPr lang="en-US" smtClean="0">
                 <a:latin typeface="Arial Regular"/>
               </a:rPr>
-              <a:t>12/21/21</a:t>
+              <a:t>12/24/21</a:t>
             </a:fld>
             <a:endParaRPr lang="en-US">
               <a:latin typeface="Arial Regular"/>
@@ -712,7 +712,7 @@
             <a:fld id="{C7103FDF-5845-2441-8890-D723FF5A85D0}" type="datetimeFigureOut">
               <a:rPr lang="en-US" smtClean="0"/>
               <a:pPr/>
-              <a:t>12/21/21</a:t>
+              <a:t>12/24/21</a:t>
             </a:fld>
             <a:endParaRPr lang="en-US"/>
           </a:p>
@@ -4217,7 +4217,7 @@
                   <a:srgbClr val="898C92"/>
                 </a:solidFill>
               </a:rPr>
-              <a:t>CPU Consumption</a:t>
+              <a:t>Busiest Hours of Week (CPU):</a:t>
             </a:r>
           </a:p>
         </p:txBody>
@@ -4351,7 +4351,7 @@
                 </a:solidFill>
                 <a:latin typeface="Arial" panose="020B0604020202020204" pitchFamily="34" charset="0"/>
               </a:rPr>
-              <a:t>val:oap</a:t>
+              <a:t>val:vhc</a:t>
             </a:r>
             <a:r>
               <a:rPr lang="en-US" sz="2400" dirty="0">
@@ -4360,25 +4360,7 @@
                 </a:solidFill>
                 <a:latin typeface="Arial" panose="020B0604020202020204" pitchFamily="34" charset="0"/>
               </a:rPr>
-              <a:t>--intro.csv[</a:t>
-            </a:r>
-            <a:r>
-              <a:rPr lang="en-US" sz="2400">
-                <a:solidFill>
-                  <a:srgbClr val="F3753F"/>
-                </a:solidFill>
-                <a:latin typeface="Arial" panose="020B0604020202020204" pitchFamily="34" charset="0"/>
-              </a:rPr>
-              <a:t>1:2]}}: </a:t>
-            </a:r>
-            <a:r>
-              <a:rPr lang="en-US" sz="2400" dirty="0">
-                <a:solidFill>
-                  <a:srgbClr val="F3753F"/>
-                </a:solidFill>
-                <a:latin typeface="Arial" panose="020B0604020202020204" pitchFamily="34" charset="0"/>
-              </a:rPr>
-              <a:t>{{</a:t>
+              <a:t>--intro.csv[1:2]}}: {{</a:t>
             </a:r>
             <a:r>
               <a:rPr lang="en-US" sz="2400" dirty="0" err="1">
@@ -4387,7 +4369,15 @@
                 </a:solidFill>
                 <a:latin typeface="Arial" panose="020B0604020202020204" pitchFamily="34" charset="0"/>
               </a:rPr>
-              <a:t>val:oap</a:t>
+              <a:t>val:</a:t>
+            </a:r>
+            <a:r>
+              <a:rPr lang="en-US" sz="2400" dirty="0" err="1">
+                <a:solidFill>
+                  <a:srgbClr val="F3753F"/>
+                </a:solidFill>
+              </a:rPr>
+              <a:t>vhc</a:t>
             </a:r>
             <a:r>
               <a:rPr lang="en-US" sz="2400" dirty="0">
@@ -6422,7 +6412,7 @@
         <p:spPr>
           <a:xfrm>
             <a:off x="5230871" y="2626063"/>
-            <a:ext cx="392736" cy="184666"/>
+            <a:ext cx="878446" cy="184666"/>
           </a:xfrm>
           <a:prstGeom prst="rect">
             <a:avLst/>
@@ -6437,7 +6427,7 @@
           <a:p>
             <a:r>
               <a:rPr lang="en-US" sz="1200" b="1" dirty="0"/>
-              <a:t>COD:</a:t>
+              <a:t>Active CPU:</a:t>
             </a:r>
           </a:p>
         </p:txBody>
@@ -6643,7 +6633,7 @@
             </a:ln>
             <a:extLst>
               <a:ext uri="{91240B29-F687-4f45-9708-019B960494DF}">
-                <a14:hiddenLine xmlns="" xmlns:a14="http://schemas.microsoft.com/office/drawing/2010/main" w="9525">
+                <a14:hiddenLine xmlns:a14="http://schemas.microsoft.com/office/drawing/2010/main" xmlns="" w="9525">
                   <a:solidFill>
                     <a:srgbClr val="000000"/>
                   </a:solidFill>
@@ -6843,7 +6833,7 @@
             </a:ln>
             <a:extLst>
               <a:ext uri="{91240B29-F687-4f45-9708-019B960494DF}">
-                <a14:hiddenLine xmlns="" xmlns:a14="http://schemas.microsoft.com/office/drawing/2010/main" w="9525">
+                <a14:hiddenLine xmlns:a14="http://schemas.microsoft.com/office/drawing/2010/main" xmlns="" w="9525">
                   <a:solidFill>
                     <a:srgbClr val="000000"/>
                   </a:solidFill>
@@ -7043,7 +7033,7 @@
             </a:ln>
             <a:extLst>
               <a:ext uri="{91240B29-F687-4f45-9708-019B960494DF}">
-                <a14:hiddenLine xmlns="" xmlns:a14="http://schemas.microsoft.com/office/drawing/2010/main" w="9525">
+                <a14:hiddenLine xmlns:a14="http://schemas.microsoft.com/office/drawing/2010/main" xmlns="" w="9525">
                   <a:solidFill>
                     <a:srgbClr val="000000"/>
                   </a:solidFill>
@@ -7283,7 +7273,7 @@
             </a:ln>
             <a:extLst>
               <a:ext uri="{91240B29-F687-4f45-9708-019B960494DF}">
-                <a14:hiddenLine xmlns="" xmlns:a14="http://schemas.microsoft.com/office/drawing/2010/main" w="9525">
+                <a14:hiddenLine xmlns:a14="http://schemas.microsoft.com/office/drawing/2010/main" xmlns="" w="9525">
                   <a:solidFill>
                     <a:srgbClr val="000000"/>
                   </a:solidFill>
@@ -11518,7 +11508,7 @@
     </p:spTree>
     <p:extLst>
       <p:ext uri="{BB962C8B-B14F-4D97-AF65-F5344CB8AC3E}">
-        <p14:creationId xmlns:p14="http://schemas.microsoft.com/office/powerpoint/2010/main" val="3517153267"/>
+        <p14:creationId xmlns:p14="http://schemas.microsoft.com/office/powerpoint/2010/main" val="2838025867"/>
       </p:ext>
     </p:extLst>
   </p:cSld>
@@ -12380,21 +12370,6 @@
 </file>
 
 <file path=customXml/item1.xml><?xml version="1.0" encoding="utf-8"?>
-<p:properties xmlns:p="http://schemas.microsoft.com/office/2006/metadata/properties" xmlns:xsi="http://www.w3.org/2001/XMLSchema-instance" xmlns:pc="http://schemas.microsoft.com/office/infopath/2007/PartnerControls">
-  <documentManagement/>
-</p:properties>
-</file>
-
-<file path=customXml/item2.xml><?xml version="1.0" encoding="utf-8"?>
-<?mso-contentType ?>
-<FormTemplates xmlns="http://schemas.microsoft.com/sharepoint/v3/contenttype/forms">
-  <Display>DocumentLibraryForm</Display>
-  <Edit>DocumentLibraryForm</Edit>
-  <New>DocumentLibraryForm</New>
-</FormTemplates>
-</file>
-
-<file path=customXml/item3.xml><?xml version="1.0" encoding="utf-8"?>
 <ct:contentTypeSchema xmlns:ct="http://schemas.microsoft.com/office/2006/metadata/contentType" xmlns:ma="http://schemas.microsoft.com/office/2006/metadata/properties/metaAttributes" ct:_="" ma:_="" ma:contentTypeName="Document" ma:contentTypeID="0x0101002EB8E814A3F7584EAE8FF0B3DB852A19" ma:contentTypeVersion="9" ma:contentTypeDescription="Create a new document." ma:contentTypeScope="" ma:versionID="e69ab516aeb44ea5badcc8eb89028f65">
   <xsd:schema xmlns:xsd="http://www.w3.org/2001/XMLSchema" xmlns:xs="http://www.w3.org/2001/XMLSchema" xmlns:p="http://schemas.microsoft.com/office/2006/metadata/properties" xmlns:ns2="02124634-a52d-4e0c-b527-846138045ca7" xmlns:ns3="7d2247ee-dcae-49b5-8e6a-08fc19cc9b93" targetNamespace="http://schemas.microsoft.com/office/2006/metadata/properties" ma:root="true" ma:fieldsID="059e6346cdd3e15961f0c09961190cf6" ns2:_="" ns3:_="">
     <xsd:import namespace="02124634-a52d-4e0c-b527-846138045ca7"/>
@@ -12591,32 +12566,22 @@
 </ct:contentTypeSchema>
 </file>
 
-<file path=customXml/itemProps1.xml><?xml version="1.0" encoding="utf-8"?>
-<ds:datastoreItem xmlns:ds="http://schemas.openxmlformats.org/officeDocument/2006/customXml" ds:itemID="{6609DDB2-8F90-49F6-B87F-2D5D805E2FD6}">
-  <ds:schemaRefs>
-    <ds:schemaRef ds:uri="http://www.w3.org/XML/1998/namespace"/>
-    <ds:schemaRef ds:uri="http://purl.org/dc/terms/"/>
-    <ds:schemaRef ds:uri="http://schemas.microsoft.com/office/2006/metadata/properties"/>
-    <ds:schemaRef ds:uri="http://schemas.microsoft.com/office/2006/documentManagement/types"/>
-    <ds:schemaRef ds:uri="http://schemas.openxmlformats.org/package/2006/metadata/core-properties"/>
-    <ds:schemaRef ds:uri="http://schemas.microsoft.com/office/infopath/2007/PartnerControls"/>
-    <ds:schemaRef ds:uri="http://purl.org/dc/elements/1.1/"/>
-    <ds:schemaRef ds:uri="7d2247ee-dcae-49b5-8e6a-08fc19cc9b93"/>
-    <ds:schemaRef ds:uri="02124634-a52d-4e0c-b527-846138045ca7"/>
-    <ds:schemaRef ds:uri="http://purl.org/dc/dcmitype/"/>
-  </ds:schemaRefs>
-</ds:datastoreItem>
+<file path=customXml/item2.xml><?xml version="1.0" encoding="utf-8"?>
+<?mso-contentType ?>
+<FormTemplates xmlns="http://schemas.microsoft.com/sharepoint/v3/contenttype/forms">
+  <Display>DocumentLibraryForm</Display>
+  <Edit>DocumentLibraryForm</Edit>
+  <New>DocumentLibraryForm</New>
+</FormTemplates>
 </file>
 
-<file path=customXml/itemProps2.xml><?xml version="1.0" encoding="utf-8"?>
-<ds:datastoreItem xmlns:ds="http://schemas.openxmlformats.org/officeDocument/2006/customXml" ds:itemID="{D278F648-E670-4262-A352-AA37A92B1414}">
-  <ds:schemaRefs>
-    <ds:schemaRef ds:uri="http://schemas.microsoft.com/sharepoint/v3/contenttype/forms"/>
-  </ds:schemaRefs>
-</ds:datastoreItem>
+<file path=customXml/item3.xml><?xml version="1.0" encoding="utf-8"?>
+<p:properties xmlns:p="http://schemas.microsoft.com/office/2006/metadata/properties" xmlns:xsi="http://www.w3.org/2001/XMLSchema-instance" xmlns:pc="http://schemas.microsoft.com/office/infopath/2007/PartnerControls">
+  <documentManagement/>
+</p:properties>
 </file>
 
-<file path=customXml/itemProps3.xml><?xml version="1.0" encoding="utf-8"?>
+<file path=customXml/itemProps1.xml><?xml version="1.0" encoding="utf-8"?>
 <ds:datastoreItem xmlns:ds="http://schemas.openxmlformats.org/officeDocument/2006/customXml" ds:itemID="{3B0D08CB-7837-46C6-8BCF-D192649CEE8A}">
   <ds:schemaRefs>
     <ds:schemaRef ds:uri="http://schemas.microsoft.com/office/2006/metadata/contentType"/>
@@ -12633,4 +12598,29 @@
     <ds:schemaRef ds:uri="http://schemas.microsoft.com/internal/obd"/>
   </ds:schemaRefs>
 </ds:datastoreItem>
+</file>
+
+<file path=customXml/itemProps2.xml><?xml version="1.0" encoding="utf-8"?>
+<ds:datastoreItem xmlns:ds="http://schemas.openxmlformats.org/officeDocument/2006/customXml" ds:itemID="{D278F648-E670-4262-A352-AA37A92B1414}">
+  <ds:schemaRefs>
+    <ds:schemaRef ds:uri="http://schemas.microsoft.com/sharepoint/v3/contenttype/forms"/>
+  </ds:schemaRefs>
+</ds:datastoreItem>
+</file>
+
+<file path=customXml/itemProps3.xml><?xml version="1.0" encoding="utf-8"?>
+<ds:datastoreItem xmlns:ds="http://schemas.openxmlformats.org/officeDocument/2006/customXml" ds:itemID="{6609DDB2-8F90-49F6-B87F-2D5D805E2FD6}">
+  <ds:schemaRefs>
+    <ds:schemaRef ds:uri="http://www.w3.org/XML/1998/namespace"/>
+    <ds:schemaRef ds:uri="http://purl.org/dc/terms/"/>
+    <ds:schemaRef ds:uri="http://schemas.microsoft.com/office/2006/metadata/properties"/>
+    <ds:schemaRef ds:uri="http://schemas.microsoft.com/office/2006/documentManagement/types"/>
+    <ds:schemaRef ds:uri="http://schemas.openxmlformats.org/package/2006/metadata/core-properties"/>
+    <ds:schemaRef ds:uri="http://schemas.microsoft.com/office/infopath/2007/PartnerControls"/>
+    <ds:schemaRef ds:uri="http://purl.org/dc/elements/1.1/"/>
+    <ds:schemaRef ds:uri="7d2247ee-dcae-49b5-8e6a-08fc19cc9b93"/>
+    <ds:schemaRef ds:uri="02124634-a52d-4e0c-b527-846138045ca7"/>
+    <ds:schemaRef ds:uri="http://purl.org/dc/dcmitype/"/>
+  </ds:schemaRefs>
+</ds:datastoreItem>
 </file>
</xml_diff>

<commit_message>
Add new PowerPoint presentations
</commit_message>
<xml_diff>
--- a/Solutions/ppt/Vantage Health Check On a Page.pptx
+++ b/Solutions/ppt/Vantage Health Check On a Page.pptx
@@ -11,7 +11,7 @@
     <p:handoutMasterId r:id="rId7"/>
   </p:handoutMasterIdLst>
   <p:sldIdLst>
-    <p:sldId id="2142532933" r:id="rId5"/>
+    <p:sldId id="2142532951" r:id="rId5"/>
   </p:sldIdLst>
   <p:sldSz cx="12192000" cy="6858000"/>
   <p:notesSz cx="6858000" cy="2409825"/>
@@ -522,7 +522,7 @@
               <a:rPr lang="en-US" smtClean="0">
                 <a:latin typeface="Arial Regular"/>
               </a:rPr>
-              <a:t>12/24/21</a:t>
+              <a:t>2/20/2024</a:t>
             </a:fld>
             <a:endParaRPr lang="en-US">
               <a:latin typeface="Arial Regular"/>
@@ -712,7 +712,7 @@
             <a:fld id="{C7103FDF-5845-2441-8890-D723FF5A85D0}" type="datetimeFigureOut">
               <a:rPr lang="en-US" smtClean="0"/>
               <a:pPr/>
-              <a:t>12/24/21</a:t>
+              <a:t>2/20/2024</a:t>
             </a:fld>
             <a:endParaRPr lang="en-US"/>
           </a:p>
@@ -1028,149 +1028,32 @@
           <a:bodyPr/>
           <a:lstStyle/>
           <a:p>
-            <a:pPr marL="0" indent="0">
-              <a:buNone/>
-            </a:pPr>
-            <a:r>
-              <a:rPr lang="en-US" b="1" dirty="0">
-                <a:solidFill>
-                  <a:srgbClr val="FF0000"/>
-                </a:solidFill>
-              </a:rPr>
-              <a:t>Interpretation:</a:t>
-            </a:r>
-          </a:p>
-          <a:p>
-            <a:pPr marL="0" indent="0">
-              <a:buNone/>
-            </a:pPr>
-            <a:endParaRPr lang="en-US" dirty="0"/>
-          </a:p>
-          <a:p>
-            <a:pPr marL="0" indent="0">
-              <a:buNone/>
-            </a:pPr>
-            <a:endParaRPr lang="en-US" dirty="0"/>
-          </a:p>
-          <a:p>
-            <a:pPr marL="0" indent="0">
-              <a:buNone/>
-            </a:pPr>
-            <a:r>
-              <a:rPr lang="en-US" b="1" dirty="0"/>
-              <a:t>Client Toolset:</a:t>
-            </a:r>
-          </a:p>
-          <a:p>
-            <a:pPr marL="628650" lvl="1" indent="-171450">
-              <a:buFont typeface="Arial" panose="020B0604020202020204" pitchFamily="34" charset="0"/>
-              <a:buChar char="•"/>
-            </a:pPr>
-            <a:r>
-              <a:rPr lang="en-US" b="0" i="0" dirty="0">
-                <a:solidFill>
-                  <a:srgbClr val="242424"/>
-                </a:solidFill>
-                <a:effectLst/>
-                <a:latin typeface="Segoe UI" panose="020B0502040204020203" pitchFamily="34" charset="0"/>
-              </a:rPr>
-              <a:t>shows the degree of testing needed for a client software upgrade</a:t>
-            </a:r>
-          </a:p>
-          <a:p>
-            <a:pPr marL="628650" lvl="1" indent="-171450">
-              <a:buFont typeface="Arial" panose="020B0604020202020204" pitchFamily="34" charset="0"/>
-              <a:buChar char="•"/>
-            </a:pPr>
-            <a:r>
-              <a:rPr lang="en-US" b="0" i="0" dirty="0">
-                <a:solidFill>
-                  <a:srgbClr val="242424"/>
-                </a:solidFill>
-                <a:effectLst/>
-                <a:latin typeface="Segoe UI" panose="020B0502040204020203" pitchFamily="34" charset="0"/>
-              </a:rPr>
-              <a:t>can drill down to how client tools are managed, e.g. there might be TTU 14 somewhere</a:t>
-            </a:r>
-            <a:endParaRPr lang="en-US" dirty="0"/>
-          </a:p>
-          <a:p>
-            <a:pPr marL="0" indent="0">
-              <a:buNone/>
-            </a:pPr>
-            <a:endParaRPr lang="en-US" dirty="0"/>
-          </a:p>
-          <a:p>
-            <a:pPr marL="0" indent="0">
-              <a:buNone/>
-            </a:pPr>
-            <a:r>
-              <a:rPr lang="en-US" b="1" dirty="0"/>
-              <a:t>System Info</a:t>
-            </a:r>
-          </a:p>
-          <a:p>
-            <a:pPr marL="628650" lvl="1" indent="-171450">
-              <a:buFont typeface="Arial" panose="020B0604020202020204" pitchFamily="34" charset="0"/>
-              <a:buChar char="•"/>
-            </a:pPr>
-            <a:r>
-              <a:rPr lang="en-US" dirty="0"/>
-              <a:t> </a:t>
-            </a:r>
-          </a:p>
-          <a:p>
-            <a:pPr marL="0" lvl="0" indent="0">
-              <a:buFont typeface="Arial" panose="020B0604020202020204" pitchFamily="34" charset="0"/>
-              <a:buNone/>
-            </a:pPr>
-            <a:endParaRPr lang="en-US" dirty="0"/>
-          </a:p>
-          <a:p>
-            <a:pPr marL="0" lvl="0" indent="0">
-              <a:buFont typeface="Arial" panose="020B0604020202020204" pitchFamily="34" charset="0"/>
-              <a:buNone/>
-            </a:pPr>
-            <a:r>
-              <a:rPr lang="en-US" b="1" dirty="0"/>
-              <a:t>Average Queries/Day</a:t>
-            </a:r>
-          </a:p>
-          <a:p>
-            <a:pPr marL="628650" lvl="1" indent="-171450">
-              <a:buFont typeface="Arial" panose="020B0604020202020204" pitchFamily="34" charset="0"/>
-              <a:buChar char="•"/>
-            </a:pPr>
-            <a:endParaRPr lang="en-US" dirty="0"/>
-          </a:p>
-          <a:p>
-            <a:pPr marL="0" lvl="0" indent="0">
-              <a:buFont typeface="Arial" panose="020B0604020202020204" pitchFamily="34" charset="0"/>
-              <a:buNone/>
-            </a:pPr>
-            <a:endParaRPr lang="en-US" dirty="0"/>
-          </a:p>
-          <a:p>
-            <a:r>
-              <a:rPr lang="en-US" sz="1200" b="1">
-                <a:solidFill>
-                  <a:schemeClr val="accent4"/>
-                </a:solidFill>
-              </a:rPr>
-              <a:t>Observed System Availability </a:t>
-            </a:r>
-            <a:endParaRPr lang="en-US" sz="1000" b="1">
-              <a:solidFill>
-                <a:schemeClr val="accent4"/>
-              </a:solidFill>
-            </a:endParaRPr>
-          </a:p>
-          <a:p>
-            <a:pPr marL="0" lvl="0" indent="0">
-              <a:buFont typeface="Arial" panose="020B0604020202020204" pitchFamily="34" charset="0"/>
-              <a:buNone/>
-            </a:pPr>
-            <a:endParaRPr lang="en-US" dirty="0"/>
+            <a:r>
+              <a:rPr lang="en-GB" sz="1200" b="1" dirty="0"/>
+              <a:t>Query Count</a:t>
+            </a:r>
+            <a:r>
+              <a:rPr lang="en-GB" sz="1200" dirty="0"/>
+              <a:t> refers to the number of queries executed. Each time a query is sent for execution, it is counted as one query. A query can be single or multi-statement.</a:t>
+            </a:r>
+          </a:p>
+          <a:p>
+            <a:endParaRPr lang="en-GB" sz="1200" dirty="0"/>
+          </a:p>
+          <a:p>
+            <a:r>
+              <a:rPr lang="en-GB" sz="1200" b="1" dirty="0"/>
+              <a:t>Statement Count </a:t>
+            </a:r>
+            <a:r>
+              <a:rPr lang="en-GB" sz="1200" dirty="0"/>
+              <a:t>refers to the number of individual SQL statements within a single query or transaction. A query or transaction can contain multiple SQL statements, such as Begin Transaction, SELECT, INSERT, End Transaction etc</a:t>
+            </a:r>
+            <a:r>
+              <a:rPr lang="en-GB" sz="1200"/>
+              <a:t>. </a:t>
+            </a:r>
+            <a:endParaRPr lang="en-US" sz="1200"/>
           </a:p>
         </p:txBody>
       </p:sp>
@@ -1181,7 +1064,7 @@
             <a:spLocks noGrp="1"/>
           </p:cNvSpPr>
           <p:nvPr>
-            <p:ph type="sldNum" sz="quarter" idx="10"/>
+            <p:ph type="sldNum" sz="quarter" idx="5"/>
           </p:nvPr>
         </p:nvSpPr>
         <p:spPr/>
@@ -1189,18 +1072,18 @@
           <a:bodyPr/>
           <a:lstStyle/>
           <a:p>
-            <a:fld id="{E66732C8-2723-40E9-9AD3-803C668FA178}" type="slidenum">
-              <a:rPr lang="en-US" smtClean="0"/>
+            <a:fld id="{830CB422-1C33-CB43-B2F9-92730F80FF20}" type="slidenum">
+              <a:rPr lang="en-PK" smtClean="0"/>
               <a:t>1</a:t>
             </a:fld>
-            <a:endParaRPr lang="en-US"/>
+            <a:endParaRPr lang="en-PK" dirty="0"/>
           </a:p>
         </p:txBody>
       </p:sp>
     </p:spTree>
     <p:extLst>
       <p:ext uri="{BB962C8B-B14F-4D97-AF65-F5344CB8AC3E}">
-        <p14:creationId xmlns:p14="http://schemas.microsoft.com/office/powerpoint/2010/main" val="2477336225"/>
+        <p14:creationId xmlns:p14="http://schemas.microsoft.com/office/powerpoint/2010/main" val="3867667500"/>
       </p:ext>
     </p:extLst>
   </p:cSld>
@@ -2871,10 +2754,180 @@
       </p:grpSpPr>
       <p:sp>
         <p:nvSpPr>
-          <p:cNvPr id="99" name="Rounded Rectangle 6">
+          <p:cNvPr id="2" name="Footer Placeholder 1">
             <a:extLst>
               <a:ext uri="{FF2B5EF4-FFF2-40B4-BE49-F238E27FC236}">
-                <a16:creationId xmlns:a16="http://schemas.microsoft.com/office/drawing/2014/main" id="{6975A98C-42E1-4744-9A9F-A095E02A28B9}"/>
+                <a16:creationId xmlns:a16="http://schemas.microsoft.com/office/drawing/2014/main" id="{35CAC3B8-A746-F56A-19B9-ADB7B422FAFF}"/>
+              </a:ext>
+            </a:extLst>
+          </p:cNvPr>
+          <p:cNvSpPr>
+            <a:spLocks noGrp="1"/>
+          </p:cNvSpPr>
+          <p:nvPr>
+            <p:ph type="ftr" sz="quarter" idx="4294967295"/>
+          </p:nvPr>
+        </p:nvSpPr>
+        <p:spPr>
+          <a:xfrm>
+            <a:off x="9217152" y="6286500"/>
+            <a:ext cx="2057400" cy="365759"/>
+          </a:xfrm>
+          <a:prstGeom prst="rect">
+            <a:avLst/>
+          </a:prstGeom>
+        </p:spPr>
+        <p:txBody>
+          <a:bodyPr/>
+          <a:lstStyle/>
+          <a:p>
+            <a:pPr algn="l"/>
+            <a:r>
+              <a:rPr lang="en-US"/>
+              <a:t>Internal use only</a:t>
+            </a:r>
+            <a:endParaRPr lang="en-US" dirty="0"/>
+          </a:p>
+        </p:txBody>
+      </p:sp>
+      <p:sp>
+        <p:nvSpPr>
+          <p:cNvPr id="3" name="Slide Number Placeholder 2">
+            <a:extLst>
+              <a:ext uri="{FF2B5EF4-FFF2-40B4-BE49-F238E27FC236}">
+                <a16:creationId xmlns:a16="http://schemas.microsoft.com/office/drawing/2014/main" id="{E41D6422-8F24-07E0-331C-4215830A8DF0}"/>
+              </a:ext>
+            </a:extLst>
+          </p:cNvPr>
+          <p:cNvSpPr>
+            <a:spLocks noGrp="1"/>
+          </p:cNvSpPr>
+          <p:nvPr>
+            <p:ph type="sldNum" sz="quarter" idx="12"/>
+          </p:nvPr>
+        </p:nvSpPr>
+        <p:spPr>
+          <a:xfrm>
+            <a:off x="11277600" y="6286500"/>
+            <a:ext cx="457200" cy="365760"/>
+          </a:xfrm>
+          <a:prstGeom prst="rect">
+            <a:avLst/>
+          </a:prstGeom>
+        </p:spPr>
+        <p:txBody>
+          <a:bodyPr vert="horz" lIns="0" tIns="0" rIns="0" bIns="0" rtlCol="0" anchor="t" anchorCtr="0"/>
+          <a:lstStyle>
+            <a:defPPr>
+              <a:defRPr lang="en-US"/>
+            </a:defPPr>
+            <a:lvl1pPr marL="0" algn="r" defTabSz="914400" rtl="0" eaLnBrk="1" latinLnBrk="0" hangingPunct="1">
+              <a:defRPr sz="900" kern="1200">
+                <a:solidFill>
+                  <a:schemeClr val="tx1"/>
+                </a:solidFill>
+                <a:latin typeface="+mn-lt"/>
+                <a:ea typeface="+mn-ea"/>
+                <a:cs typeface="+mn-cs"/>
+              </a:defRPr>
+            </a:lvl1pPr>
+            <a:lvl2pPr marL="457200" algn="l" defTabSz="914400" rtl="0" eaLnBrk="1" latinLnBrk="0" hangingPunct="1">
+              <a:defRPr sz="1800" kern="1200">
+                <a:solidFill>
+                  <a:schemeClr val="tx1"/>
+                </a:solidFill>
+                <a:latin typeface="+mn-lt"/>
+                <a:ea typeface="+mn-ea"/>
+                <a:cs typeface="+mn-cs"/>
+              </a:defRPr>
+            </a:lvl2pPr>
+            <a:lvl3pPr marL="914400" algn="l" defTabSz="914400" rtl="0" eaLnBrk="1" latinLnBrk="0" hangingPunct="1">
+              <a:defRPr sz="1800" kern="1200">
+                <a:solidFill>
+                  <a:schemeClr val="tx1"/>
+                </a:solidFill>
+                <a:latin typeface="+mn-lt"/>
+                <a:ea typeface="+mn-ea"/>
+                <a:cs typeface="+mn-cs"/>
+              </a:defRPr>
+            </a:lvl3pPr>
+            <a:lvl4pPr marL="1371600" algn="l" defTabSz="914400" rtl="0" eaLnBrk="1" latinLnBrk="0" hangingPunct="1">
+              <a:defRPr sz="1800" kern="1200">
+                <a:solidFill>
+                  <a:schemeClr val="tx1"/>
+                </a:solidFill>
+                <a:latin typeface="+mn-lt"/>
+                <a:ea typeface="+mn-ea"/>
+                <a:cs typeface="+mn-cs"/>
+              </a:defRPr>
+            </a:lvl4pPr>
+            <a:lvl5pPr marL="1828800" algn="l" defTabSz="914400" rtl="0" eaLnBrk="1" latinLnBrk="0" hangingPunct="1">
+              <a:defRPr sz="1800" kern="1200">
+                <a:solidFill>
+                  <a:schemeClr val="tx1"/>
+                </a:solidFill>
+                <a:latin typeface="+mn-lt"/>
+                <a:ea typeface="+mn-ea"/>
+                <a:cs typeface="+mn-cs"/>
+              </a:defRPr>
+            </a:lvl5pPr>
+            <a:lvl6pPr marL="2286000" algn="l" defTabSz="914400" rtl="0" eaLnBrk="1" latinLnBrk="0" hangingPunct="1">
+              <a:defRPr sz="1800" kern="1200">
+                <a:solidFill>
+                  <a:schemeClr val="tx1"/>
+                </a:solidFill>
+                <a:latin typeface="+mn-lt"/>
+                <a:ea typeface="+mn-ea"/>
+                <a:cs typeface="+mn-cs"/>
+              </a:defRPr>
+            </a:lvl6pPr>
+            <a:lvl7pPr marL="2743200" algn="l" defTabSz="914400" rtl="0" eaLnBrk="1" latinLnBrk="0" hangingPunct="1">
+              <a:defRPr sz="1800" kern="1200">
+                <a:solidFill>
+                  <a:schemeClr val="tx1"/>
+                </a:solidFill>
+                <a:latin typeface="+mn-lt"/>
+                <a:ea typeface="+mn-ea"/>
+                <a:cs typeface="+mn-cs"/>
+              </a:defRPr>
+            </a:lvl7pPr>
+            <a:lvl8pPr marL="3200400" algn="l" defTabSz="914400" rtl="0" eaLnBrk="1" latinLnBrk="0" hangingPunct="1">
+              <a:defRPr sz="1800" kern="1200">
+                <a:solidFill>
+                  <a:schemeClr val="tx1"/>
+                </a:solidFill>
+                <a:latin typeface="+mn-lt"/>
+                <a:ea typeface="+mn-ea"/>
+                <a:cs typeface="+mn-cs"/>
+              </a:defRPr>
+            </a:lvl8pPr>
+            <a:lvl9pPr marL="3657600" algn="l" defTabSz="914400" rtl="0" eaLnBrk="1" latinLnBrk="0" hangingPunct="1">
+              <a:defRPr sz="1800" kern="1200">
+                <a:solidFill>
+                  <a:schemeClr val="tx1"/>
+                </a:solidFill>
+                <a:latin typeface="+mn-lt"/>
+                <a:ea typeface="+mn-ea"/>
+                <a:cs typeface="+mn-cs"/>
+              </a:defRPr>
+            </a:lvl9pPr>
+          </a:lstStyle>
+          <a:p>
+            <a:fld id="{0885F5B2-48F7-4F18-A961-C29AAE44EB58}" type="slidenum">
+              <a:rPr lang="en-US" smtClean="0"/>
+              <a:pPr/>
+              <a:t>1</a:t>
+            </a:fld>
+            <a:endParaRPr lang="en-US" dirty="0"/>
+          </a:p>
+        </p:txBody>
+      </p:sp>
+      <p:sp>
+        <p:nvSpPr>
+          <p:cNvPr id="107" name="Rounded Rectangle 6">
+            <a:extLst>
+              <a:ext uri="{FF2B5EF4-FFF2-40B4-BE49-F238E27FC236}">
+                <a16:creationId xmlns:a16="http://schemas.microsoft.com/office/drawing/2014/main" id="{38C975D9-F720-E65A-CC6C-8F00175F2564}"/>
               </a:ext>
             </a:extLst>
           </p:cNvPr>
@@ -2927,10 +2980,10 @@
       </p:sp>
       <p:sp>
         <p:nvSpPr>
-          <p:cNvPr id="147" name="Rounded Rectangle 2">
+          <p:cNvPr id="108" name="Rounded Rectangle 2">
             <a:extLst>
               <a:ext uri="{FF2B5EF4-FFF2-40B4-BE49-F238E27FC236}">
-                <a16:creationId xmlns:a16="http://schemas.microsoft.com/office/drawing/2014/main" id="{1E9AA515-BDC5-44CC-B395-523928E0CF03}"/>
+                <a16:creationId xmlns:a16="http://schemas.microsoft.com/office/drawing/2014/main" id="{823A6EC3-288F-E78A-7ECC-022235CA1308}"/>
               </a:ext>
             </a:extLst>
           </p:cNvPr>
@@ -3029,10 +3082,10 @@
       </p:sp>
       <p:sp>
         <p:nvSpPr>
-          <p:cNvPr id="148" name="Rounded Rectangle 5">
+          <p:cNvPr id="109" name="Rounded Rectangle 5">
             <a:extLst>
               <a:ext uri="{FF2B5EF4-FFF2-40B4-BE49-F238E27FC236}">
-                <a16:creationId xmlns:a16="http://schemas.microsoft.com/office/drawing/2014/main" id="{9F2528F3-469B-4F66-808F-ECF474549E3B}"/>
+                <a16:creationId xmlns:a16="http://schemas.microsoft.com/office/drawing/2014/main" id="{4CD5CD8E-5B5B-4501-841D-DBC024B67C1D}"/>
               </a:ext>
             </a:extLst>
           </p:cNvPr>
@@ -3085,10 +3138,10 @@
       </p:sp>
       <p:sp>
         <p:nvSpPr>
-          <p:cNvPr id="150" name="Rounded Rectangle 7">
+          <p:cNvPr id="110" name="Rounded Rectangle 7">
             <a:extLst>
               <a:ext uri="{FF2B5EF4-FFF2-40B4-BE49-F238E27FC236}">
-                <a16:creationId xmlns:a16="http://schemas.microsoft.com/office/drawing/2014/main" id="{1362BCC5-AEA9-477A-ADAC-37A63C63554B}"/>
+                <a16:creationId xmlns:a16="http://schemas.microsoft.com/office/drawing/2014/main" id="{6CD535F4-0563-C76B-89F6-FB525C16054D}"/>
               </a:ext>
             </a:extLst>
           </p:cNvPr>
@@ -3141,10 +3194,10 @@
       </p:sp>
       <p:sp>
         <p:nvSpPr>
-          <p:cNvPr id="151" name="Rounded Rectangle 8">
+          <p:cNvPr id="111" name="Rounded Rectangle 8">
             <a:extLst>
               <a:ext uri="{FF2B5EF4-FFF2-40B4-BE49-F238E27FC236}">
-                <a16:creationId xmlns:a16="http://schemas.microsoft.com/office/drawing/2014/main" id="{4153F27D-0E47-41BF-A424-7F31C1FB2ECA}"/>
+                <a16:creationId xmlns:a16="http://schemas.microsoft.com/office/drawing/2014/main" id="{2105A1A4-0CE3-CB46-A436-5D1A43CAB68A}"/>
               </a:ext>
             </a:extLst>
           </p:cNvPr>
@@ -3197,10 +3250,10 @@
       </p:sp>
       <p:sp>
         <p:nvSpPr>
-          <p:cNvPr id="1027" name="Rectangle 1026">
+          <p:cNvPr id="112" name="Rectangle 111">
             <a:extLst>
               <a:ext uri="{FF2B5EF4-FFF2-40B4-BE49-F238E27FC236}">
-                <a16:creationId xmlns:a16="http://schemas.microsoft.com/office/drawing/2014/main" id="{DBA348C1-8265-426A-8E51-B18A172FE77B}"/>
+                <a16:creationId xmlns:a16="http://schemas.microsoft.com/office/drawing/2014/main" id="{6DFBE370-3D16-C9AA-751B-2E2E36DEBB78}"/>
               </a:ext>
             </a:extLst>
           </p:cNvPr>
@@ -3249,10 +3302,10 @@
       </p:sp>
       <p:sp>
         <p:nvSpPr>
-          <p:cNvPr id="304" name="TextBox 303">
+          <p:cNvPr id="113" name="TextBox 112">
             <a:extLst>
               <a:ext uri="{FF2B5EF4-FFF2-40B4-BE49-F238E27FC236}">
-                <a16:creationId xmlns:a16="http://schemas.microsoft.com/office/drawing/2014/main" id="{AC9A4635-67BB-4FDA-BAF1-A6CEE396E4DE}"/>
+                <a16:creationId xmlns:a16="http://schemas.microsoft.com/office/drawing/2014/main" id="{0E96BDA7-1DB0-432D-81EA-F879C8BAAB5F}"/>
               </a:ext>
             </a:extLst>
           </p:cNvPr>
@@ -3262,7 +3315,7 @@
         <p:spPr>
           <a:xfrm>
             <a:off x="605245" y="2187316"/>
-            <a:ext cx="1085233" cy="215444"/>
+            <a:ext cx="2742739" cy="215444"/>
           </a:xfrm>
           <a:prstGeom prst="rect">
             <a:avLst/>
@@ -3278,14 +3331,20 @@
             <a:r>
               <a:rPr lang="en-US" sz="1400" b="1" dirty="0">
                 <a:solidFill>
-                  <a:srgbClr val="0070C0"/>
+                  <a:schemeClr val="tx2">
+                    <a:lumMod val="60000"/>
+                    <a:lumOff val="40000"/>
+                  </a:schemeClr>
                 </a:solidFill>
               </a:rPr>
-              <a:t>Active Users</a:t>
+              <a:t>Avg Response Time/Statement</a:t>
             </a:r>
             <a:endParaRPr lang="en-US" sz="1050" b="1" dirty="0">
               <a:solidFill>
-                <a:srgbClr val="0070C0"/>
+                <a:schemeClr val="tx2">
+                  <a:lumMod val="60000"/>
+                  <a:lumOff val="40000"/>
+                </a:schemeClr>
               </a:solidFill>
             </a:endParaRPr>
           </a:p>
@@ -3293,10 +3352,10 @@
       </p:sp>
       <p:sp>
         <p:nvSpPr>
-          <p:cNvPr id="305" name="Rectangle 304">
+          <p:cNvPr id="114" name="Rectangle 113">
             <a:extLst>
               <a:ext uri="{FF2B5EF4-FFF2-40B4-BE49-F238E27FC236}">
-                <a16:creationId xmlns:a16="http://schemas.microsoft.com/office/drawing/2014/main" id="{810C169E-385F-4BDD-A1DB-1457AB8300ED}"/>
+                <a16:creationId xmlns:a16="http://schemas.microsoft.com/office/drawing/2014/main" id="{6BB5DBE7-F691-58E4-3C42-B7B13B213539}"/>
               </a:ext>
             </a:extLst>
           </p:cNvPr>
@@ -3305,7 +3364,7 @@
         </p:nvSpPr>
         <p:spPr>
           <a:xfrm>
-            <a:off x="605246" y="2445747"/>
+            <a:off x="630908" y="2440846"/>
             <a:ext cx="3318747" cy="699796"/>
           </a:xfrm>
           <a:prstGeom prst="rect">
@@ -3345,10 +3404,10 @@
       </p:sp>
       <p:sp>
         <p:nvSpPr>
-          <p:cNvPr id="307" name="TextBox 306">
+          <p:cNvPr id="115" name="TextBox 114">
             <a:extLst>
               <a:ext uri="{FF2B5EF4-FFF2-40B4-BE49-F238E27FC236}">
-                <a16:creationId xmlns:a16="http://schemas.microsoft.com/office/drawing/2014/main" id="{EA90460E-7505-4615-9B97-6319966A1C63}"/>
+                <a16:creationId xmlns:a16="http://schemas.microsoft.com/office/drawing/2014/main" id="{C35C3E3E-10DA-1C4D-3ED3-377ECE4FDD3A}"/>
               </a:ext>
             </a:extLst>
           </p:cNvPr>
@@ -3358,7 +3417,7 @@
         <p:spPr>
           <a:xfrm>
             <a:off x="605245" y="3296646"/>
-            <a:ext cx="1792157" cy="215444"/>
+            <a:ext cx="1128514" cy="215444"/>
           </a:xfrm>
           <a:prstGeom prst="rect">
             <a:avLst/>
@@ -3374,14 +3433,14 @@
             <a:r>
               <a:rPr lang="en-US" sz="1400" b="1" dirty="0">
                 <a:solidFill>
-                  <a:schemeClr val="accent3"/>
+                  <a:srgbClr val="0070C0"/>
                 </a:solidFill>
               </a:rPr>
-              <a:t>System Concurrency</a:t>
+              <a:t>Active Users</a:t>
             </a:r>
             <a:endParaRPr lang="en-US" sz="1050" b="1" dirty="0">
               <a:solidFill>
-                <a:schemeClr val="accent3"/>
+                <a:srgbClr val="0070C0"/>
               </a:solidFill>
             </a:endParaRPr>
           </a:p>
@@ -3389,10 +3448,10 @@
       </p:sp>
       <p:sp>
         <p:nvSpPr>
-          <p:cNvPr id="308" name="Rectangle 307">
+          <p:cNvPr id="116" name="Rectangle 115">
             <a:extLst>
               <a:ext uri="{FF2B5EF4-FFF2-40B4-BE49-F238E27FC236}">
-                <a16:creationId xmlns:a16="http://schemas.microsoft.com/office/drawing/2014/main" id="{46EA9681-8EBA-4F0B-B784-C66AB9CAE3AB}"/>
+                <a16:creationId xmlns:a16="http://schemas.microsoft.com/office/drawing/2014/main" id="{818F0CB1-ECE8-B70D-5D06-5C3379963589}"/>
               </a:ext>
             </a:extLst>
           </p:cNvPr>
@@ -3441,10 +3500,10 @@
       </p:sp>
       <p:sp>
         <p:nvSpPr>
-          <p:cNvPr id="310" name="TextBox 309">
+          <p:cNvPr id="117" name="TextBox 116">
             <a:extLst>
               <a:ext uri="{FF2B5EF4-FFF2-40B4-BE49-F238E27FC236}">
-                <a16:creationId xmlns:a16="http://schemas.microsoft.com/office/drawing/2014/main" id="{BAAE79AD-0478-4FAD-AC67-20EDB82CBF6E}"/>
+                <a16:creationId xmlns:a16="http://schemas.microsoft.com/office/drawing/2014/main" id="{3C5FB123-8A85-5C7D-B922-614D258E1289}"/>
               </a:ext>
             </a:extLst>
           </p:cNvPr>
@@ -3454,7 +3513,7 @@
         <p:spPr>
           <a:xfrm>
             <a:off x="605245" y="4405976"/>
-            <a:ext cx="2543453" cy="215444"/>
+            <a:ext cx="1861087" cy="215444"/>
           </a:xfrm>
           <a:prstGeom prst="rect">
             <a:avLst/>
@@ -3470,14 +3529,14 @@
             <a:r>
               <a:rPr lang="en-US" sz="1400" b="1" dirty="0">
                 <a:solidFill>
-                  <a:schemeClr val="accent4"/>
+                  <a:schemeClr val="accent3"/>
                 </a:solidFill>
               </a:rPr>
-              <a:t>Observed System Availability </a:t>
+              <a:t>System Concurrency</a:t>
             </a:r>
             <a:endParaRPr lang="en-US" sz="1050" b="1" dirty="0">
               <a:solidFill>
-                <a:schemeClr val="accent4"/>
+                <a:schemeClr val="accent3"/>
               </a:solidFill>
             </a:endParaRPr>
           </a:p>
@@ -3485,10 +3544,10 @@
       </p:sp>
       <p:sp>
         <p:nvSpPr>
-          <p:cNvPr id="311" name="Rectangle 310">
+          <p:cNvPr id="118" name="Rectangle 117">
             <a:extLst>
               <a:ext uri="{FF2B5EF4-FFF2-40B4-BE49-F238E27FC236}">
-                <a16:creationId xmlns:a16="http://schemas.microsoft.com/office/drawing/2014/main" id="{B503FAFF-CC55-4593-A768-9D7E5DD1ADE9}"/>
+                <a16:creationId xmlns:a16="http://schemas.microsoft.com/office/drawing/2014/main" id="{843C172A-F44D-74BB-7640-434C2B629CAA}"/>
               </a:ext>
             </a:extLst>
           </p:cNvPr>
@@ -3537,10 +3596,10 @@
       </p:sp>
       <p:sp>
         <p:nvSpPr>
-          <p:cNvPr id="313" name="TextBox 312">
+          <p:cNvPr id="119" name="TextBox 118">
             <a:extLst>
               <a:ext uri="{FF2B5EF4-FFF2-40B4-BE49-F238E27FC236}">
-                <a16:creationId xmlns:a16="http://schemas.microsoft.com/office/drawing/2014/main" id="{F995E4BB-75E7-4949-818D-E2D0FEC33A31}"/>
+                <a16:creationId xmlns:a16="http://schemas.microsoft.com/office/drawing/2014/main" id="{772D7A05-5ED3-60AA-1038-27D9821233C9}"/>
               </a:ext>
             </a:extLst>
           </p:cNvPr>
@@ -3550,7 +3609,7 @@
         <p:spPr>
           <a:xfrm>
             <a:off x="605246" y="5515304"/>
-            <a:ext cx="655629" cy="215444"/>
+            <a:ext cx="687689" cy="215444"/>
           </a:xfrm>
           <a:prstGeom prst="rect">
             <a:avLst/>
@@ -3566,14 +3625,14 @@
             <a:r>
               <a:rPr lang="en-US" sz="1400" b="1" dirty="0">
                 <a:solidFill>
-                  <a:schemeClr val="accent5"/>
+                  <a:srgbClr val="04CE7E"/>
                 </a:solidFill>
               </a:rPr>
               <a:t>Objects</a:t>
             </a:r>
             <a:endParaRPr lang="en-US" sz="1050" b="1" dirty="0">
               <a:solidFill>
-                <a:schemeClr val="accent5"/>
+                <a:srgbClr val="04CE7E"/>
               </a:solidFill>
             </a:endParaRPr>
           </a:p>
@@ -3581,10 +3640,10 @@
       </p:sp>
       <p:sp>
         <p:nvSpPr>
-          <p:cNvPr id="314" name="Rectangle 313">
+          <p:cNvPr id="120" name="Rectangle 119">
             <a:extLst>
               <a:ext uri="{FF2B5EF4-FFF2-40B4-BE49-F238E27FC236}">
-                <a16:creationId xmlns:a16="http://schemas.microsoft.com/office/drawing/2014/main" id="{CA9DF822-9A90-4381-A7F3-628C7B199087}"/>
+                <a16:creationId xmlns:a16="http://schemas.microsoft.com/office/drawing/2014/main" id="{9D32843C-DD82-2AFA-60F8-BEF766C76CCD}"/>
               </a:ext>
             </a:extLst>
           </p:cNvPr>
@@ -3633,10 +3692,10 @@
       </p:sp>
       <p:sp>
         <p:nvSpPr>
-          <p:cNvPr id="1031" name="Rectangle: Rounded Corners 1030">
+          <p:cNvPr id="121" name="Rectangle: Rounded Corners 120">
             <a:extLst>
               <a:ext uri="{FF2B5EF4-FFF2-40B4-BE49-F238E27FC236}">
-                <a16:creationId xmlns:a16="http://schemas.microsoft.com/office/drawing/2014/main" id="{6F25C0EE-5A1E-4DBF-973B-8C5C2F3FC4DF}"/>
+                <a16:creationId xmlns:a16="http://schemas.microsoft.com/office/drawing/2014/main" id="{E0A3D36E-5C87-BA2D-80BA-C38F981C4F72}"/>
               </a:ext>
             </a:extLst>
           </p:cNvPr>
@@ -3690,10 +3749,10 @@
       </p:sp>
       <p:sp>
         <p:nvSpPr>
-          <p:cNvPr id="317" name="Rectangle: Rounded Corners 316">
+          <p:cNvPr id="122" name="Rectangle: Rounded Corners 121">
             <a:extLst>
               <a:ext uri="{FF2B5EF4-FFF2-40B4-BE49-F238E27FC236}">
-                <a16:creationId xmlns:a16="http://schemas.microsoft.com/office/drawing/2014/main" id="{72743F42-73A8-4AB9-BA70-06CD9A2BE6AA}"/>
+                <a16:creationId xmlns:a16="http://schemas.microsoft.com/office/drawing/2014/main" id="{546481EF-C5B5-4AD1-4A77-4390E79D999D}"/>
               </a:ext>
             </a:extLst>
           </p:cNvPr>
@@ -3747,10 +3806,10 @@
       </p:sp>
       <p:sp>
         <p:nvSpPr>
-          <p:cNvPr id="318" name="Rectangle: Rounded Corners 317">
+          <p:cNvPr id="123" name="Rectangle: Rounded Corners 122">
             <a:extLst>
               <a:ext uri="{FF2B5EF4-FFF2-40B4-BE49-F238E27FC236}">
-                <a16:creationId xmlns:a16="http://schemas.microsoft.com/office/drawing/2014/main" id="{AF9D6F95-B8BC-439B-879F-27A3A0A6D13E}"/>
+                <a16:creationId xmlns:a16="http://schemas.microsoft.com/office/drawing/2014/main" id="{8ABD8D4F-B59B-4A48-7FFF-2EBD0CCBF025}"/>
               </a:ext>
             </a:extLst>
           </p:cNvPr>
@@ -3804,10 +3863,10 @@
       </p:sp>
       <p:sp>
         <p:nvSpPr>
-          <p:cNvPr id="319" name="Rectangle: Rounded Corners 318">
+          <p:cNvPr id="124" name="Rectangle: Rounded Corners 123">
             <a:extLst>
               <a:ext uri="{FF2B5EF4-FFF2-40B4-BE49-F238E27FC236}">
-                <a16:creationId xmlns:a16="http://schemas.microsoft.com/office/drawing/2014/main" id="{F48C68AF-BC04-40C6-A67C-74FC31E54F02}"/>
+                <a16:creationId xmlns:a16="http://schemas.microsoft.com/office/drawing/2014/main" id="{17175ED4-DA9D-940A-3004-FDCD6BD9F7DD}"/>
               </a:ext>
             </a:extLst>
           </p:cNvPr>
@@ -3861,10 +3920,10 @@
       </p:sp>
       <p:sp>
         <p:nvSpPr>
-          <p:cNvPr id="320" name="Rectangle: Rounded Corners 319">
+          <p:cNvPr id="125" name="Rectangle: Rounded Corners 124">
             <a:extLst>
               <a:ext uri="{FF2B5EF4-FFF2-40B4-BE49-F238E27FC236}">
-                <a16:creationId xmlns:a16="http://schemas.microsoft.com/office/drawing/2014/main" id="{1CE12EB3-D665-444B-825C-FB74C65A38C5}"/>
+                <a16:creationId xmlns:a16="http://schemas.microsoft.com/office/drawing/2014/main" id="{B390BB9A-4475-A27E-FC0E-E403DD9EA20C}"/>
               </a:ext>
             </a:extLst>
           </p:cNvPr>
@@ -3918,10 +3977,10 @@
       </p:sp>
       <p:sp>
         <p:nvSpPr>
-          <p:cNvPr id="323" name="TextBox 322">
+          <p:cNvPr id="126" name="TextBox 125">
             <a:extLst>
               <a:ext uri="{FF2B5EF4-FFF2-40B4-BE49-F238E27FC236}">
-                <a16:creationId xmlns:a16="http://schemas.microsoft.com/office/drawing/2014/main" id="{A13A68A7-27F1-4C05-A7C8-01F182F7F92F}"/>
+                <a16:creationId xmlns:a16="http://schemas.microsoft.com/office/drawing/2014/main" id="{7F070227-8B9E-4511-EA3D-747DFFC974E0}"/>
               </a:ext>
             </a:extLst>
           </p:cNvPr>
@@ -3961,20 +4020,17 @@
             </a:r>
             <a:r>
               <a:rPr lang="en-US" dirty="0"/>
-              <a:t>--query_counts.csv[1:6]}} Million</a:t>
-            </a:r>
-          </a:p>
-          <a:p>
-            <a:endParaRPr lang="en-US" dirty="0"/>
+              <a:t>--query_counts.csv[1:6]}} Million Statements</a:t>
+            </a:r>
           </a:p>
         </p:txBody>
       </p:sp>
       <p:sp>
         <p:nvSpPr>
-          <p:cNvPr id="324" name="TextBox 323">
+          <p:cNvPr id="127" name="TextBox 126">
             <a:extLst>
               <a:ext uri="{FF2B5EF4-FFF2-40B4-BE49-F238E27FC236}">
-                <a16:creationId xmlns:a16="http://schemas.microsoft.com/office/drawing/2014/main" id="{F7F0B33D-AD68-452B-8B58-2F433F205314}"/>
+                <a16:creationId xmlns:a16="http://schemas.microsoft.com/office/drawing/2014/main" id="{8F46965D-F736-82FC-6A68-E15D4441E2FC}"/>
               </a:ext>
             </a:extLst>
           </p:cNvPr>
@@ -3983,7 +4039,7 @@
         </p:nvSpPr>
         <p:spPr>
           <a:xfrm>
-            <a:off x="1489275" y="2626367"/>
+            <a:off x="1489241" y="3740551"/>
             <a:ext cx="2207653" cy="338554"/>
           </a:xfrm>
           <a:prstGeom prst="rect">
@@ -4021,10 +4077,10 @@
       </p:sp>
       <p:sp>
         <p:nvSpPr>
-          <p:cNvPr id="326" name="TextBox 325">
+          <p:cNvPr id="128" name="TextBox 127">
             <a:extLst>
               <a:ext uri="{FF2B5EF4-FFF2-40B4-BE49-F238E27FC236}">
-                <a16:creationId xmlns:a16="http://schemas.microsoft.com/office/drawing/2014/main" id="{22D082B3-8CEC-48DF-BAE5-9BFD58B84611}"/>
+                <a16:creationId xmlns:a16="http://schemas.microsoft.com/office/drawing/2014/main" id="{674BF6A0-9FAC-CFAA-C0CB-E5BC58D72E87}"/>
               </a:ext>
             </a:extLst>
           </p:cNvPr>
@@ -4033,8 +4089,8 @@
         </p:nvSpPr>
         <p:spPr>
           <a:xfrm>
-            <a:off x="1489276" y="4929666"/>
-            <a:ext cx="3045456" cy="169277"/>
+            <a:off x="1489276" y="4845028"/>
+            <a:ext cx="3045456" cy="338554"/>
           </a:xfrm>
           <a:prstGeom prst="rect">
             <a:avLst/>
@@ -4048,30 +4104,26 @@
           <a:lstStyle/>
           <a:p>
             <a:r>
-              <a:rPr lang="en-US" sz="1100" dirty="0"/>
+              <a:rPr lang="en-US" sz="1100" b="1" dirty="0"/>
               <a:t>{{</a:t>
             </a:r>
             <a:r>
-              <a:rPr lang="en-US" sz="1100" dirty="0" err="1"/>
+              <a:rPr lang="en-US" sz="1100" b="1" dirty="0" err="1"/>
               <a:t>val:oap</a:t>
             </a:r>
             <a:r>
-              <a:rPr lang="en-US" sz="1100" dirty="0"/>
-              <a:t>--sys_availability.csv[1:4]}}</a:t>
-            </a:r>
-            <a:r>
               <a:rPr lang="en-US" sz="1100" b="1" dirty="0"/>
-              <a:t> %</a:t>
+              <a:t>--concurrency.csv[1:5]}} Peak Concurrency</a:t>
             </a:r>
           </a:p>
         </p:txBody>
       </p:sp>
       <p:pic>
         <p:nvPicPr>
-          <p:cNvPr id="1039" name="Graphic 1038">
+          <p:cNvPr id="129" name="Graphic 128">
             <a:extLst>
               <a:ext uri="{FF2B5EF4-FFF2-40B4-BE49-F238E27FC236}">
-                <a16:creationId xmlns:a16="http://schemas.microsoft.com/office/drawing/2014/main" id="{7C4A9679-D39B-4902-98C8-B87F62EAD09A}"/>
+                <a16:creationId xmlns:a16="http://schemas.microsoft.com/office/drawing/2014/main" id="{44445224-60FA-D058-2386-D9485FB56A26}"/>
               </a:ext>
             </a:extLst>
           </p:cNvPr>
@@ -4107,10 +4159,10 @@
       </p:pic>
       <p:pic>
         <p:nvPicPr>
-          <p:cNvPr id="1043" name="Graphic 1042">
+          <p:cNvPr id="130" name="Graphic 129">
             <a:extLst>
               <a:ext uri="{FF2B5EF4-FFF2-40B4-BE49-F238E27FC236}">
-                <a16:creationId xmlns:a16="http://schemas.microsoft.com/office/drawing/2014/main" id="{E9759CE3-DA66-4A96-8A0A-CF7B9C57B401}"/>
+                <a16:creationId xmlns:a16="http://schemas.microsoft.com/office/drawing/2014/main" id="{C5FA5BDD-E715-F4B7-6C7C-7772B6E601A6}"/>
               </a:ext>
             </a:extLst>
           </p:cNvPr>
@@ -4136,47 +4188,8 @@
         </p:blipFill>
         <p:spPr>
           <a:xfrm>
-            <a:off x="730200" y="3629151"/>
+            <a:off x="739652" y="4729872"/>
             <a:ext cx="551651" cy="551651"/>
-          </a:xfrm>
-          <a:prstGeom prst="rect">
-            <a:avLst/>
-          </a:prstGeom>
-        </p:spPr>
-      </p:pic>
-      <p:pic>
-        <p:nvPicPr>
-          <p:cNvPr id="1045" name="Graphic 1044">
-            <a:extLst>
-              <a:ext uri="{FF2B5EF4-FFF2-40B4-BE49-F238E27FC236}">
-                <a16:creationId xmlns:a16="http://schemas.microsoft.com/office/drawing/2014/main" id="{BBCD23DC-7DF8-4235-9A82-90DAADC151D8}"/>
-              </a:ext>
-            </a:extLst>
-          </p:cNvPr>
-          <p:cNvPicPr>
-            <a:picLocks noChangeAspect="1"/>
-          </p:cNvPicPr>
-          <p:nvPr/>
-        </p:nvPicPr>
-        <p:blipFill>
-          <a:blip r:embed="rId7" cstate="print">
-            <a:extLst>
-              <a:ext uri="{28A0092B-C50C-407E-A947-70E740481C1C}">
-                <a14:useLocalDpi xmlns:a14="http://schemas.microsoft.com/office/drawing/2010/main" val="0"/>
-              </a:ext>
-              <a:ext uri="{96DAC541-7B7A-43D3-8B79-37D633B846F1}">
-                <asvg:svgBlip xmlns:asvg="http://schemas.microsoft.com/office/drawing/2016/SVG/main" r:embed="rId8"/>
-              </a:ext>
-            </a:extLst>
-          </a:blip>
-          <a:stretch>
-            <a:fillRect/>
-          </a:stretch>
-        </p:blipFill>
-        <p:spPr>
-          <a:xfrm>
-            <a:off x="749969" y="4758250"/>
-            <a:ext cx="512113" cy="512113"/>
           </a:xfrm>
           <a:prstGeom prst="rect">
             <a:avLst/>
@@ -4185,10 +4198,10 @@
       </p:pic>
       <p:sp>
         <p:nvSpPr>
-          <p:cNvPr id="352" name="TextBox 351">
+          <p:cNvPr id="132" name="TextBox 131">
             <a:extLst>
               <a:ext uri="{FF2B5EF4-FFF2-40B4-BE49-F238E27FC236}">
-                <a16:creationId xmlns:a16="http://schemas.microsoft.com/office/drawing/2014/main" id="{D5D3AFEC-6EA8-4051-9877-76A9CC3260BD}"/>
+                <a16:creationId xmlns:a16="http://schemas.microsoft.com/office/drawing/2014/main" id="{72CF1105-36D9-A78E-C241-00DBC6EE9065}"/>
               </a:ext>
             </a:extLst>
           </p:cNvPr>
@@ -4224,10 +4237,10 @@
       </p:sp>
       <p:sp>
         <p:nvSpPr>
-          <p:cNvPr id="383" name="TextBox 382">
+          <p:cNvPr id="133" name="TextBox 132">
             <a:extLst>
               <a:ext uri="{FF2B5EF4-FFF2-40B4-BE49-F238E27FC236}">
-                <a16:creationId xmlns:a16="http://schemas.microsoft.com/office/drawing/2014/main" id="{5E3E264B-7659-48F5-8224-7182191FC872}"/>
+                <a16:creationId xmlns:a16="http://schemas.microsoft.com/office/drawing/2014/main" id="{FD7D1838-FBC2-E6C0-9603-98A36CD5C3BD}"/>
               </a:ext>
             </a:extLst>
           </p:cNvPr>
@@ -4263,10 +4276,10 @@
       </p:sp>
       <p:sp>
         <p:nvSpPr>
-          <p:cNvPr id="397" name="TextBox 396">
+          <p:cNvPr id="134" name="TextBox 133">
             <a:extLst>
               <a:ext uri="{FF2B5EF4-FFF2-40B4-BE49-F238E27FC236}">
-                <a16:creationId xmlns:a16="http://schemas.microsoft.com/office/drawing/2014/main" id="{B66C7D28-97A9-4FC5-8F51-0836DBA20C08}"/>
+                <a16:creationId xmlns:a16="http://schemas.microsoft.com/office/drawing/2014/main" id="{65B34E14-A261-0BE9-0404-5ABCA242EBA1}"/>
               </a:ext>
             </a:extLst>
           </p:cNvPr>
@@ -4276,7 +4289,7 @@
         <p:spPr>
           <a:xfrm>
             <a:off x="8241125" y="3664552"/>
-            <a:ext cx="2482539" cy="215444"/>
+            <a:ext cx="2483052" cy="215444"/>
           </a:xfrm>
           <a:prstGeom prst="rect">
             <a:avLst/>
@@ -4297,7 +4310,27 @@
                   </a:schemeClr>
                 </a:solidFill>
               </a:rPr>
-              <a:t>Top 5 Users by Query Count</a:t>
+              <a:t>Top 5 Users </a:t>
+            </a:r>
+            <a:r>
+              <a:rPr lang="en-US" sz="1400" b="1">
+                <a:solidFill>
+                  <a:schemeClr val="bg1">
+                    <a:lumMod val="50000"/>
+                  </a:schemeClr>
+                </a:solidFill>
+              </a:rPr>
+              <a:t>by Query </a:t>
+            </a:r>
+            <a:r>
+              <a:rPr lang="en-US" sz="1400" b="1" dirty="0">
+                <a:solidFill>
+                  <a:schemeClr val="bg1">
+                    <a:lumMod val="50000"/>
+                  </a:schemeClr>
+                </a:solidFill>
+              </a:rPr>
+              <a:t>Count</a:t>
             </a:r>
             <a:endParaRPr lang="en-US" sz="1050" b="1" dirty="0">
               <a:solidFill>
@@ -4311,10 +4344,10 @@
       </p:sp>
       <p:sp>
         <p:nvSpPr>
-          <p:cNvPr id="4" name="Title 3">
+          <p:cNvPr id="135" name="Title 3">
             <a:extLst>
               <a:ext uri="{FF2B5EF4-FFF2-40B4-BE49-F238E27FC236}">
-                <a16:creationId xmlns:a16="http://schemas.microsoft.com/office/drawing/2014/main" id="{F029E76D-3C5A-4585-9E26-86EDF20BDF09}"/>
+                <a16:creationId xmlns:a16="http://schemas.microsoft.com/office/drawing/2014/main" id="{36C61B12-9A0A-A5E7-570C-198053B26C66}"/>
               </a:ext>
             </a:extLst>
           </p:cNvPr>
@@ -4327,7 +4360,7 @@
         </p:nvSpPr>
         <p:spPr>
           <a:xfrm>
-            <a:off x="467885" y="50866"/>
+            <a:off x="454690" y="111393"/>
             <a:ext cx="11495965" cy="715294"/>
           </a:xfrm>
         </p:spPr>
@@ -4336,67 +4369,40 @@
           <a:lstStyle/>
           <a:p>
             <a:r>
-              <a:rPr lang="en-US" sz="2400" dirty="0">
-                <a:solidFill>
-                  <a:srgbClr val="F3753F"/>
-                </a:solidFill>
-                <a:latin typeface="Arial" panose="020B0604020202020204" pitchFamily="34" charset="0"/>
-              </a:rPr>
+              <a:rPr lang="en-US" sz="2400" dirty="0"/>
               <a:t>VHC on a page -- {{</a:t>
             </a:r>
             <a:r>
-              <a:rPr lang="en-US" sz="2400" dirty="0" err="1">
-                <a:solidFill>
-                  <a:srgbClr val="F3753F"/>
-                </a:solidFill>
-                <a:latin typeface="Arial" panose="020B0604020202020204" pitchFamily="34" charset="0"/>
-              </a:rPr>
+              <a:rPr lang="en-US" sz="2400" dirty="0" err="1"/>
               <a:t>val:vhc</a:t>
             </a:r>
             <a:r>
-              <a:rPr lang="en-US" sz="2400" dirty="0">
-                <a:solidFill>
-                  <a:srgbClr val="F3753F"/>
-                </a:solidFill>
-                <a:latin typeface="Arial" panose="020B0604020202020204" pitchFamily="34" charset="0"/>
-              </a:rPr>
+              <a:rPr lang="en-US" sz="2400" dirty="0"/>
               <a:t>--intro.csv[1:2]}}: {{</a:t>
             </a:r>
             <a:r>
-              <a:rPr lang="en-US" sz="2400" dirty="0" err="1">
-                <a:solidFill>
-                  <a:srgbClr val="F3753F"/>
-                </a:solidFill>
-                <a:latin typeface="Arial" panose="020B0604020202020204" pitchFamily="34" charset="0"/>
-              </a:rPr>
-              <a:t>val:</a:t>
-            </a:r>
-            <a:r>
-              <a:rPr lang="en-US" sz="2400" dirty="0" err="1">
-                <a:solidFill>
-                  <a:srgbClr val="F3753F"/>
-                </a:solidFill>
-              </a:rPr>
-              <a:t>vhc</a:t>
-            </a:r>
-            <a:r>
-              <a:rPr lang="en-US" sz="2400" dirty="0">
-                <a:solidFill>
-                  <a:srgbClr val="F3753F"/>
-                </a:solidFill>
-                <a:latin typeface="Arial" panose="020B0604020202020204" pitchFamily="34" charset="0"/>
-              </a:rPr>
+              <a:rPr lang="en-US" sz="2400" dirty="0" err="1"/>
+              <a:t>val:vhc</a:t>
+            </a:r>
+            <a:r>
+              <a:rPr lang="en-US" sz="2400" dirty="0"/>
               <a:t>--intro.csv[1:1]}}</a:t>
             </a:r>
+            <a:endParaRPr lang="en-US" sz="2400" dirty="0">
+              <a:solidFill>
+                <a:srgbClr val="F3753F"/>
+              </a:solidFill>
+              <a:latin typeface="Arial" panose="020B0604020202020204" pitchFamily="34" charset="0"/>
+            </a:endParaRPr>
           </a:p>
         </p:txBody>
       </p:sp>
       <p:grpSp>
         <p:nvGrpSpPr>
-          <p:cNvPr id="43" name="Group 42">
+          <p:cNvPr id="136" name="Group 135">
             <a:extLst>
               <a:ext uri="{FF2B5EF4-FFF2-40B4-BE49-F238E27FC236}">
-                <a16:creationId xmlns:a16="http://schemas.microsoft.com/office/drawing/2014/main" id="{04CEC1B9-1024-4E2D-AEF3-CBE4F1D43438}"/>
+                <a16:creationId xmlns:a16="http://schemas.microsoft.com/office/drawing/2014/main" id="{61DF5199-B585-F7B1-AE16-2C870EDF53D2}"/>
               </a:ext>
             </a:extLst>
           </p:cNvPr>
@@ -4405,24 +4411,24 @@
         </p:nvGrpSpPr>
         <p:grpSpPr>
           <a:xfrm>
-            <a:off x="687190" y="2521085"/>
+            <a:off x="723220" y="3638275"/>
             <a:ext cx="528795" cy="511970"/>
             <a:chOff x="7824978" y="3832098"/>
             <a:chExt cx="335280" cy="324612"/>
           </a:xfrm>
           <a:solidFill>
-            <a:schemeClr val="tx2">
-              <a:lumMod val="40000"/>
-              <a:lumOff val="60000"/>
+            <a:schemeClr val="tx1">
+              <a:lumMod val="10000"/>
+              <a:lumOff val="90000"/>
             </a:schemeClr>
           </a:solidFill>
         </p:grpSpPr>
         <p:sp>
           <p:nvSpPr>
-            <p:cNvPr id="44" name="Freeform 45">
+            <p:cNvPr id="137" name="Freeform 45">
               <a:extLst>
                 <a:ext uri="{FF2B5EF4-FFF2-40B4-BE49-F238E27FC236}">
-                  <a16:creationId xmlns:a16="http://schemas.microsoft.com/office/drawing/2014/main" id="{EA435217-F73A-4A0B-8CD6-941ED9E9D9DA}"/>
+                  <a16:creationId xmlns:a16="http://schemas.microsoft.com/office/drawing/2014/main" id="{F7F033EC-5B9D-0443-866F-6154B773D252}"/>
                 </a:ext>
               </a:extLst>
             </p:cNvPr>
@@ -4498,7 +4504,12 @@
             </a:custGeom>
             <a:grpFill/>
             <a:ln w="9525" cap="flat">
-              <a:noFill/>
+              <a:solidFill>
+                <a:schemeClr val="tx1">
+                  <a:lumMod val="25000"/>
+                  <a:lumOff val="75000"/>
+                </a:schemeClr>
+              </a:solidFill>
               <a:prstDash val="solid"/>
               <a:miter/>
             </a:ln>
@@ -4543,10 +4554,10 @@
         </p:sp>
         <p:sp>
           <p:nvSpPr>
-            <p:cNvPr id="45" name="Freeform 46">
+            <p:cNvPr id="138" name="Freeform 46">
               <a:extLst>
                 <a:ext uri="{FF2B5EF4-FFF2-40B4-BE49-F238E27FC236}">
-                  <a16:creationId xmlns:a16="http://schemas.microsoft.com/office/drawing/2014/main" id="{EE763D96-A011-4E32-BD91-564F14E8B6C9}"/>
+                  <a16:creationId xmlns:a16="http://schemas.microsoft.com/office/drawing/2014/main" id="{A82017A5-EBBF-6CDF-430C-62C81FE91546}"/>
                 </a:ext>
               </a:extLst>
             </p:cNvPr>
@@ -4626,7 +4637,12 @@
             </a:custGeom>
             <a:grpFill/>
             <a:ln w="9525" cap="flat">
-              <a:noFill/>
+              <a:solidFill>
+                <a:schemeClr val="tx1">
+                  <a:lumMod val="25000"/>
+                  <a:lumOff val="75000"/>
+                </a:schemeClr>
+              </a:solidFill>
               <a:prstDash val="solid"/>
               <a:miter/>
             </a:ln>
@@ -4671,10 +4687,10 @@
         </p:sp>
         <p:sp>
           <p:nvSpPr>
-            <p:cNvPr id="46" name="Freeform 47">
+            <p:cNvPr id="139" name="Freeform 47">
               <a:extLst>
                 <a:ext uri="{FF2B5EF4-FFF2-40B4-BE49-F238E27FC236}">
-                  <a16:creationId xmlns:a16="http://schemas.microsoft.com/office/drawing/2014/main" id="{5574CABB-C5EE-49DC-AC9F-DE6AE616C3DD}"/>
+                  <a16:creationId xmlns:a16="http://schemas.microsoft.com/office/drawing/2014/main" id="{A2A82F7D-C61F-29D9-51AC-4CD734491E41}"/>
                 </a:ext>
               </a:extLst>
             </p:cNvPr>
@@ -4750,7 +4766,12 @@
             </a:custGeom>
             <a:grpFill/>
             <a:ln w="9525" cap="flat">
-              <a:noFill/>
+              <a:solidFill>
+                <a:schemeClr val="tx1">
+                  <a:lumMod val="25000"/>
+                  <a:lumOff val="75000"/>
+                </a:schemeClr>
+              </a:solidFill>
               <a:prstDash val="solid"/>
               <a:miter/>
             </a:ln>
@@ -4795,10 +4816,10 @@
         </p:sp>
         <p:sp>
           <p:nvSpPr>
-            <p:cNvPr id="47" name="Freeform 48">
+            <p:cNvPr id="140" name="Freeform 48">
               <a:extLst>
                 <a:ext uri="{FF2B5EF4-FFF2-40B4-BE49-F238E27FC236}">
-                  <a16:creationId xmlns:a16="http://schemas.microsoft.com/office/drawing/2014/main" id="{82F3F9ED-5480-42DF-8E1C-C1BBDB1F0705}"/>
+                  <a16:creationId xmlns:a16="http://schemas.microsoft.com/office/drawing/2014/main" id="{B32D3AB4-A697-7677-63D5-E8704D622123}"/>
                 </a:ext>
               </a:extLst>
             </p:cNvPr>
@@ -4878,7 +4899,12 @@
             </a:custGeom>
             <a:grpFill/>
             <a:ln w="9525" cap="flat">
-              <a:noFill/>
+              <a:solidFill>
+                <a:schemeClr val="tx1">
+                  <a:lumMod val="25000"/>
+                  <a:lumOff val="75000"/>
+                </a:schemeClr>
+              </a:solidFill>
               <a:prstDash val="solid"/>
               <a:miter/>
             </a:ln>
@@ -4923,10 +4949,10 @@
         </p:sp>
         <p:sp>
           <p:nvSpPr>
-            <p:cNvPr id="48" name="Freeform 49">
+            <p:cNvPr id="141" name="Freeform 49">
               <a:extLst>
                 <a:ext uri="{FF2B5EF4-FFF2-40B4-BE49-F238E27FC236}">
-                  <a16:creationId xmlns:a16="http://schemas.microsoft.com/office/drawing/2014/main" id="{7BEAA821-A47A-4DCF-BAB9-3DEB82E037A3}"/>
+                  <a16:creationId xmlns:a16="http://schemas.microsoft.com/office/drawing/2014/main" id="{6581D5EB-D5FD-AFE6-8227-30AB4DB26683}"/>
                 </a:ext>
               </a:extLst>
             </p:cNvPr>
@@ -5002,7 +5028,12 @@
             </a:custGeom>
             <a:grpFill/>
             <a:ln w="9525" cap="flat">
-              <a:noFill/>
+              <a:solidFill>
+                <a:schemeClr val="tx1">
+                  <a:lumMod val="25000"/>
+                  <a:lumOff val="75000"/>
+                </a:schemeClr>
+              </a:solidFill>
               <a:prstDash val="solid"/>
               <a:miter/>
             </a:ln>
@@ -5047,10 +5078,10 @@
         </p:sp>
         <p:sp>
           <p:nvSpPr>
-            <p:cNvPr id="49" name="Freeform 55">
+            <p:cNvPr id="142" name="Freeform 55">
               <a:extLst>
                 <a:ext uri="{FF2B5EF4-FFF2-40B4-BE49-F238E27FC236}">
-                  <a16:creationId xmlns:a16="http://schemas.microsoft.com/office/drawing/2014/main" id="{62927B37-B167-4796-8DBF-89C576B11080}"/>
+                  <a16:creationId xmlns:a16="http://schemas.microsoft.com/office/drawing/2014/main" id="{CF12B3BF-D822-74DD-56E4-9E3EFA323976}"/>
                 </a:ext>
               </a:extLst>
             </p:cNvPr>
@@ -5130,7 +5161,12 @@
             </a:custGeom>
             <a:grpFill/>
             <a:ln w="9525" cap="flat">
-              <a:noFill/>
+              <a:solidFill>
+                <a:schemeClr val="tx1">
+                  <a:lumMod val="25000"/>
+                  <a:lumOff val="75000"/>
+                </a:schemeClr>
+              </a:solidFill>
               <a:prstDash val="solid"/>
               <a:miter/>
             </a:ln>
@@ -5175,10 +5211,10 @@
         </p:sp>
         <p:sp>
           <p:nvSpPr>
-            <p:cNvPr id="50" name="Freeform 56">
+            <p:cNvPr id="143" name="Freeform 56">
               <a:extLst>
                 <a:ext uri="{FF2B5EF4-FFF2-40B4-BE49-F238E27FC236}">
-                  <a16:creationId xmlns:a16="http://schemas.microsoft.com/office/drawing/2014/main" id="{15B47DBD-19A8-400D-A692-E57FF351CE93}"/>
+                  <a16:creationId xmlns:a16="http://schemas.microsoft.com/office/drawing/2014/main" id="{BD4917C5-1A5C-7689-DC8C-16060A3C2B47}"/>
                 </a:ext>
               </a:extLst>
             </p:cNvPr>
@@ -5254,7 +5290,12 @@
             </a:custGeom>
             <a:grpFill/>
             <a:ln w="9525" cap="flat">
-              <a:noFill/>
+              <a:solidFill>
+                <a:schemeClr val="tx1">
+                  <a:lumMod val="25000"/>
+                  <a:lumOff val="75000"/>
+                </a:schemeClr>
+              </a:solidFill>
               <a:prstDash val="solid"/>
               <a:miter/>
             </a:ln>
@@ -5300,10 +5341,10 @@
       </p:grpSp>
       <p:sp>
         <p:nvSpPr>
-          <p:cNvPr id="52" name="TextBox 51">
+          <p:cNvPr id="145" name="TextBox 144">
             <a:extLst>
               <a:ext uri="{FF2B5EF4-FFF2-40B4-BE49-F238E27FC236}">
-                <a16:creationId xmlns:a16="http://schemas.microsoft.com/office/drawing/2014/main" id="{F2478D7A-EEC8-4673-BC87-36F86AB009C0}"/>
+                <a16:creationId xmlns:a16="http://schemas.microsoft.com/office/drawing/2014/main" id="{E055A6EC-91F1-F433-78E8-123D35210BE1}"/>
               </a:ext>
             </a:extLst>
           </p:cNvPr>
@@ -5312,8 +5353,8 @@
         </p:nvSpPr>
         <p:spPr>
           <a:xfrm>
-            <a:off x="1501322" y="3826963"/>
-            <a:ext cx="4311252" cy="169277"/>
+            <a:off x="1482896" y="1635955"/>
+            <a:ext cx="2554370" cy="338554"/>
           </a:xfrm>
           <a:prstGeom prst="rect">
             <a:avLst/>
@@ -5343,70 +5384,17 @@
             </a:r>
             <a:r>
               <a:rPr lang="en-US" dirty="0"/>
-              <a:t>--concurrency.csv[1:5]}} Concurrent queries (peak)</a:t>
+              <a:t>--query_counts.csv[1:20]}} Million Queries</a:t>
             </a:r>
           </a:p>
         </p:txBody>
       </p:sp>
       <p:sp>
         <p:nvSpPr>
-          <p:cNvPr id="51" name="TextBox 50">
+          <p:cNvPr id="146" name="TextBox 145">
             <a:extLst>
               <a:ext uri="{FF2B5EF4-FFF2-40B4-BE49-F238E27FC236}">
-                <a16:creationId xmlns:a16="http://schemas.microsoft.com/office/drawing/2014/main" id="{B5B730F2-1F2B-42E5-8B72-1D1426266F96}"/>
-              </a:ext>
-            </a:extLst>
-          </p:cNvPr>
-          <p:cNvSpPr txBox="1"/>
-          <p:nvPr/>
-        </p:nvSpPr>
-        <p:spPr>
-          <a:xfrm>
-            <a:off x="1489275" y="1672352"/>
-            <a:ext cx="4323299" cy="338554"/>
-          </a:xfrm>
-          <a:prstGeom prst="rect">
-            <a:avLst/>
-          </a:prstGeom>
-          <a:noFill/>
-        </p:spPr>
-        <p:txBody>
-          <a:bodyPr wrap="square" lIns="0" tIns="0" rIns="0" bIns="0" rtlCol="0" anchor="ctr" anchorCtr="0">
-            <a:spAutoFit/>
-          </a:bodyPr>
-          <a:lstStyle>
-            <a:defPPr>
-              <a:defRPr lang="en-US"/>
-            </a:defPPr>
-            <a:lvl1pPr>
-              <a:defRPr sz="1100" b="1"/>
-            </a:lvl1pPr>
-          </a:lstStyle>
-          <a:p>
-            <a:r>
-              <a:rPr lang="en-US" dirty="0"/>
-              <a:t>{{</a:t>
-            </a:r>
-            <a:r>
-              <a:rPr lang="en-US" dirty="0" err="1"/>
-              <a:t>val:oap</a:t>
-            </a:r>
-            <a:r>
-              <a:rPr lang="en-US" dirty="0"/>
-              <a:t>--query_counts.csv[1:15]}} secs Average response time</a:t>
-            </a:r>
-          </a:p>
-          <a:p>
-            <a:endParaRPr lang="en-US" dirty="0"/>
-          </a:p>
-        </p:txBody>
-      </p:sp>
-      <p:sp>
-        <p:nvSpPr>
-          <p:cNvPr id="54" name="TextBox 53">
-            <a:extLst>
-              <a:ext uri="{FF2B5EF4-FFF2-40B4-BE49-F238E27FC236}">
-                <a16:creationId xmlns:a16="http://schemas.microsoft.com/office/drawing/2014/main" id="{7F278678-D1FA-4853-A8BC-EB7815814319}"/>
+                <a16:creationId xmlns:a16="http://schemas.microsoft.com/office/drawing/2014/main" id="{097CC207-9D28-9815-E593-37EFD203B966}"/>
               </a:ext>
             </a:extLst>
           </p:cNvPr>
@@ -5469,10 +5457,10 @@
       </p:sp>
       <p:sp>
         <p:nvSpPr>
-          <p:cNvPr id="53" name="TextBox 52">
+          <p:cNvPr id="147" name="TextBox 146">
             <a:extLst>
               <a:ext uri="{FF2B5EF4-FFF2-40B4-BE49-F238E27FC236}">
-                <a16:creationId xmlns:a16="http://schemas.microsoft.com/office/drawing/2014/main" id="{963EFCD3-DCD6-486D-BCC1-61A52A389BEB}"/>
+                <a16:creationId xmlns:a16="http://schemas.microsoft.com/office/drawing/2014/main" id="{22B2642F-332C-5CEB-6E77-92905CD7B8F8}"/>
               </a:ext>
             </a:extLst>
           </p:cNvPr>
@@ -5481,8 +5469,8 @@
         </p:nvSpPr>
         <p:spPr>
           <a:xfrm>
-            <a:off x="605245" y="1061208"/>
-            <a:ext cx="6290505" cy="215444"/>
+            <a:off x="605246" y="1061208"/>
+            <a:ext cx="3619856" cy="215444"/>
           </a:xfrm>
           <a:prstGeom prst="rect">
             <a:avLst/>
@@ -5501,47 +5489,7 @@
                   <a:srgbClr val="898C92"/>
                 </a:solidFill>
               </a:rPr>
-              <a:t>Average Queries/day (</a:t>
-            </a:r>
-            <a:r>
-              <a:rPr lang="en-PH" sz="1400" dirty="0">
-                <a:solidFill>
-                  <a:srgbClr val="898C92"/>
-                </a:solidFill>
-              </a:rPr>
-              <a:t>{{</a:t>
-            </a:r>
-            <a:r>
-              <a:rPr lang="en-PH" sz="1400" dirty="0" err="1">
-                <a:solidFill>
-                  <a:srgbClr val="898C92"/>
-                </a:solidFill>
-              </a:rPr>
-              <a:t>val:oap</a:t>
-            </a:r>
-            <a:r>
-              <a:rPr lang="en-PH" sz="1400" dirty="0">
-                <a:solidFill>
-                  <a:srgbClr val="898C92"/>
-                </a:solidFill>
-              </a:rPr>
-              <a:t>--query_counts.csv[1:14</a:t>
-            </a:r>
-            <a:r>
-              <a:rPr lang="en-PH" sz="1400" b="1" dirty="0">
-                <a:solidFill>
-                  <a:srgbClr val="898C92"/>
-                </a:solidFill>
-              </a:rPr>
-              <a:t>]}}%</a:t>
-            </a:r>
-            <a:r>
-              <a:rPr lang="en-US" sz="1400" b="1" dirty="0">
-                <a:solidFill>
-                  <a:srgbClr val="898C92"/>
-                </a:solidFill>
-              </a:rPr>
-              <a:t> Sub-Second)</a:t>
+              <a:t>Avg Activity Count/day</a:t>
             </a:r>
             <a:endParaRPr lang="en-US" sz="1050" b="1" dirty="0">
               <a:solidFill>
@@ -5553,10 +5501,10 @@
       </p:sp>
       <p:sp>
         <p:nvSpPr>
-          <p:cNvPr id="55" name="TextBox 54">
+          <p:cNvPr id="148" name="TextBox 147">
             <a:extLst>
               <a:ext uri="{FF2B5EF4-FFF2-40B4-BE49-F238E27FC236}">
-                <a16:creationId xmlns:a16="http://schemas.microsoft.com/office/drawing/2014/main" id="{972F1106-2700-4D7E-BB4C-9AAA8FB13600}"/>
+                <a16:creationId xmlns:a16="http://schemas.microsoft.com/office/drawing/2014/main" id="{A235CF5C-7651-92EE-0D65-8346521CFA36}"/>
               </a:ext>
             </a:extLst>
           </p:cNvPr>
@@ -5615,10 +5563,10 @@
       </p:sp>
       <p:sp>
         <p:nvSpPr>
-          <p:cNvPr id="57" name="Rectangle 56">
+          <p:cNvPr id="149" name="Rectangle 148">
             <a:extLst>
               <a:ext uri="{FF2B5EF4-FFF2-40B4-BE49-F238E27FC236}">
-                <a16:creationId xmlns:a16="http://schemas.microsoft.com/office/drawing/2014/main" id="{4A71473A-2A10-4CBF-B421-AB90888D172C}"/>
+                <a16:creationId xmlns:a16="http://schemas.microsoft.com/office/drawing/2014/main" id="{AD25C759-49B9-BDFC-A30E-A6E5B822305B}"/>
               </a:ext>
             </a:extLst>
           </p:cNvPr>
@@ -5699,10 +5647,10 @@
       </p:sp>
       <p:sp>
         <p:nvSpPr>
-          <p:cNvPr id="58" name="Rectangle 57">
+          <p:cNvPr id="150" name="Rectangle 149">
             <a:extLst>
               <a:ext uri="{FF2B5EF4-FFF2-40B4-BE49-F238E27FC236}">
-                <a16:creationId xmlns:a16="http://schemas.microsoft.com/office/drawing/2014/main" id="{2FBA3EB6-6AAF-4CE6-819F-A258AAF40973}"/>
+                <a16:creationId xmlns:a16="http://schemas.microsoft.com/office/drawing/2014/main" id="{BB438F13-975A-67EC-9F28-A1482B1CAF15}"/>
               </a:ext>
             </a:extLst>
           </p:cNvPr>
@@ -5755,10 +5703,10 @@
       </p:sp>
       <p:sp>
         <p:nvSpPr>
-          <p:cNvPr id="60" name="Rectangle 59">
+          <p:cNvPr id="151" name="Rectangle 150">
             <a:extLst>
               <a:ext uri="{FF2B5EF4-FFF2-40B4-BE49-F238E27FC236}">
-                <a16:creationId xmlns:a16="http://schemas.microsoft.com/office/drawing/2014/main" id="{597F329E-C5AC-4404-9EB8-5F89D74C11D0}"/>
+                <a16:creationId xmlns:a16="http://schemas.microsoft.com/office/drawing/2014/main" id="{C46F91C6-EC59-BC92-2425-7655D411DCB3}"/>
               </a:ext>
             </a:extLst>
           </p:cNvPr>
@@ -5839,10 +5787,10 @@
       </p:sp>
       <p:sp>
         <p:nvSpPr>
-          <p:cNvPr id="61" name="Rectangle 60">
+          <p:cNvPr id="152" name="Rectangle 151">
             <a:extLst>
               <a:ext uri="{FF2B5EF4-FFF2-40B4-BE49-F238E27FC236}">
-                <a16:creationId xmlns:a16="http://schemas.microsoft.com/office/drawing/2014/main" id="{1FB45AA9-3613-489A-9283-9E6F5E268247}"/>
+                <a16:creationId xmlns:a16="http://schemas.microsoft.com/office/drawing/2014/main" id="{C7EA62C3-53A5-7813-D643-B0E546E3691C}"/>
               </a:ext>
             </a:extLst>
           </p:cNvPr>
@@ -5895,10 +5843,10 @@
       </p:sp>
       <p:sp>
         <p:nvSpPr>
-          <p:cNvPr id="59" name="Rectangle 58">
+          <p:cNvPr id="153" name="Rectangle 152">
             <a:extLst>
               <a:ext uri="{FF2B5EF4-FFF2-40B4-BE49-F238E27FC236}">
-                <a16:creationId xmlns:a16="http://schemas.microsoft.com/office/drawing/2014/main" id="{D29B11E0-D2CD-46EF-862B-DFE5BF58E91C}"/>
+                <a16:creationId xmlns:a16="http://schemas.microsoft.com/office/drawing/2014/main" id="{405734C4-D0C8-9F11-EA05-26D9DA4982AD}"/>
               </a:ext>
             </a:extLst>
           </p:cNvPr>
@@ -5979,10 +5927,10 @@
       </p:sp>
       <p:sp>
         <p:nvSpPr>
-          <p:cNvPr id="62" name="Rectangle 61">
+          <p:cNvPr id="154" name="Rectangle 153">
             <a:extLst>
               <a:ext uri="{FF2B5EF4-FFF2-40B4-BE49-F238E27FC236}">
-                <a16:creationId xmlns:a16="http://schemas.microsoft.com/office/drawing/2014/main" id="{61D56A3E-EB5C-47F5-95B3-B478E9A37313}"/>
+                <a16:creationId xmlns:a16="http://schemas.microsoft.com/office/drawing/2014/main" id="{4371A5FA-9327-D8FF-22B2-46D1193BA9A0}"/>
               </a:ext>
             </a:extLst>
           </p:cNvPr>
@@ -6035,10 +5983,10 @@
       </p:sp>
       <p:sp>
         <p:nvSpPr>
-          <p:cNvPr id="149" name="Rounded Rectangle 6">
+          <p:cNvPr id="155" name="Rounded Rectangle 6">
             <a:extLst>
               <a:ext uri="{FF2B5EF4-FFF2-40B4-BE49-F238E27FC236}">
-                <a16:creationId xmlns:a16="http://schemas.microsoft.com/office/drawing/2014/main" id="{103BFF00-2D5B-4338-9CCB-ECDB5343666C}"/>
+                <a16:creationId xmlns:a16="http://schemas.microsoft.com/office/drawing/2014/main" id="{5F6330F2-D9A6-41E4-45FD-9BF7ADDB8913}"/>
               </a:ext>
             </a:extLst>
           </p:cNvPr>
@@ -6091,10 +6039,10 @@
       </p:sp>
       <p:sp>
         <p:nvSpPr>
-          <p:cNvPr id="377" name="TextBox 376">
+          <p:cNvPr id="156" name="TextBox 155">
             <a:extLst>
               <a:ext uri="{FF2B5EF4-FFF2-40B4-BE49-F238E27FC236}">
-                <a16:creationId xmlns:a16="http://schemas.microsoft.com/office/drawing/2014/main" id="{D23AED6D-DC75-4D78-8AC3-904564B2905D}"/>
+                <a16:creationId xmlns:a16="http://schemas.microsoft.com/office/drawing/2014/main" id="{D1BF50AC-DC3D-DEDC-40A8-0948C03A287F}"/>
               </a:ext>
             </a:extLst>
           </p:cNvPr>
@@ -6130,10 +6078,10 @@
       </p:sp>
       <p:sp>
         <p:nvSpPr>
-          <p:cNvPr id="63" name="Rectangle 62">
+          <p:cNvPr id="157" name="Rectangle 156">
             <a:extLst>
               <a:ext uri="{FF2B5EF4-FFF2-40B4-BE49-F238E27FC236}">
-                <a16:creationId xmlns:a16="http://schemas.microsoft.com/office/drawing/2014/main" id="{68C4FFC7-75B8-428C-ACC0-63E5E32B4781}"/>
+                <a16:creationId xmlns:a16="http://schemas.microsoft.com/office/drawing/2014/main" id="{C55FCA58-B70D-6D01-78B7-44CEFDCE014D}"/>
               </a:ext>
             </a:extLst>
           </p:cNvPr>
@@ -6182,10 +6130,10 @@
       </p:sp>
       <p:sp>
         <p:nvSpPr>
-          <p:cNvPr id="73" name="Rectangle: Rounded Corners 72">
+          <p:cNvPr id="158" name="Rectangle: Rounded Corners 157">
             <a:extLst>
               <a:ext uri="{FF2B5EF4-FFF2-40B4-BE49-F238E27FC236}">
-                <a16:creationId xmlns:a16="http://schemas.microsoft.com/office/drawing/2014/main" id="{4C42E207-FC3E-44B0-B059-D493A7C17434}"/>
+                <a16:creationId xmlns:a16="http://schemas.microsoft.com/office/drawing/2014/main" id="{3CC642AE-2DBE-C847-0A40-A510B459B9B7}"/>
               </a:ext>
             </a:extLst>
           </p:cNvPr>
@@ -6243,10 +6191,10 @@
       </p:sp>
       <p:sp>
         <p:nvSpPr>
-          <p:cNvPr id="64" name="TextBox 63">
+          <p:cNvPr id="159" name="TextBox 158">
             <a:extLst>
               <a:ext uri="{FF2B5EF4-FFF2-40B4-BE49-F238E27FC236}">
-                <a16:creationId xmlns:a16="http://schemas.microsoft.com/office/drawing/2014/main" id="{3C52D35F-83EF-4B4A-A2C5-9FCD9978C178}"/>
+                <a16:creationId xmlns:a16="http://schemas.microsoft.com/office/drawing/2014/main" id="{8FBC4594-10D4-295F-CF38-F3F628F707A1}"/>
               </a:ext>
             </a:extLst>
           </p:cNvPr>
@@ -6278,10 +6226,10 @@
       </p:sp>
       <p:sp>
         <p:nvSpPr>
-          <p:cNvPr id="91" name="TextBox 90">
+          <p:cNvPr id="160" name="TextBox 159">
             <a:extLst>
               <a:ext uri="{FF2B5EF4-FFF2-40B4-BE49-F238E27FC236}">
-                <a16:creationId xmlns:a16="http://schemas.microsoft.com/office/drawing/2014/main" id="{9001D61A-51A5-46B3-8445-06F92A173219}"/>
+                <a16:creationId xmlns:a16="http://schemas.microsoft.com/office/drawing/2014/main" id="{3558EE57-5D67-9F74-90F1-C3566E5F895A}"/>
               </a:ext>
             </a:extLst>
           </p:cNvPr>
@@ -6321,10 +6269,10 @@
       </p:sp>
       <p:sp>
         <p:nvSpPr>
-          <p:cNvPr id="93" name="TextBox 92">
+          <p:cNvPr id="161" name="TextBox 160">
             <a:extLst>
               <a:ext uri="{FF2B5EF4-FFF2-40B4-BE49-F238E27FC236}">
-                <a16:creationId xmlns:a16="http://schemas.microsoft.com/office/drawing/2014/main" id="{F7B1DA5A-A90D-4013-80D8-27712CA29347}"/>
+                <a16:creationId xmlns:a16="http://schemas.microsoft.com/office/drawing/2014/main" id="{D7CA91C1-AE4E-F494-E7ED-EFBB214B1569}"/>
               </a:ext>
             </a:extLst>
           </p:cNvPr>
@@ -6364,10 +6312,10 @@
       </p:sp>
       <p:sp>
         <p:nvSpPr>
-          <p:cNvPr id="74" name="TextBox 73">
+          <p:cNvPr id="162" name="TextBox 161">
             <a:extLst>
               <a:ext uri="{FF2B5EF4-FFF2-40B4-BE49-F238E27FC236}">
-                <a16:creationId xmlns:a16="http://schemas.microsoft.com/office/drawing/2014/main" id="{1E693583-1A61-42EA-8B60-8D41987CCF11}"/>
+                <a16:creationId xmlns:a16="http://schemas.microsoft.com/office/drawing/2014/main" id="{5F1732BE-5C14-5A09-99B4-778EA4433FF9}"/>
               </a:ext>
             </a:extLst>
           </p:cNvPr>
@@ -6399,10 +6347,10 @@
       </p:sp>
       <p:sp>
         <p:nvSpPr>
-          <p:cNvPr id="79" name="TextBox 78">
+          <p:cNvPr id="163" name="TextBox 162">
             <a:extLst>
               <a:ext uri="{FF2B5EF4-FFF2-40B4-BE49-F238E27FC236}">
-                <a16:creationId xmlns:a16="http://schemas.microsoft.com/office/drawing/2014/main" id="{B693F717-904E-412B-B509-FFF90B4BE08B}"/>
+                <a16:creationId xmlns:a16="http://schemas.microsoft.com/office/drawing/2014/main" id="{EAF29DC0-388D-D4AF-8FCE-022DBC6EDD46}"/>
               </a:ext>
             </a:extLst>
           </p:cNvPr>
@@ -6434,10 +6382,10 @@
       </p:sp>
       <p:grpSp>
         <p:nvGrpSpPr>
-          <p:cNvPr id="76" name="Group 75">
+          <p:cNvPr id="164" name="Group 163">
             <a:extLst>
               <a:ext uri="{FF2B5EF4-FFF2-40B4-BE49-F238E27FC236}">
-                <a16:creationId xmlns:a16="http://schemas.microsoft.com/office/drawing/2014/main" id="{36BA854E-6D0F-4360-BC2F-F392E0B28C82}"/>
+                <a16:creationId xmlns:a16="http://schemas.microsoft.com/office/drawing/2014/main" id="{DE5C4CE3-00BB-2767-8D13-545EC69C9F10}"/>
               </a:ext>
             </a:extLst>
           </p:cNvPr>
@@ -6459,10 +6407,10 @@
         </p:grpSpPr>
         <p:sp>
           <p:nvSpPr>
-            <p:cNvPr id="77" name="Freeform 180">
+            <p:cNvPr id="165" name="Freeform 180">
               <a:extLst>
                 <a:ext uri="{FF2B5EF4-FFF2-40B4-BE49-F238E27FC236}">
-                  <a16:creationId xmlns:a16="http://schemas.microsoft.com/office/drawing/2014/main" id="{C8D1A380-5531-4C5A-A3DB-0715E7FEE286}"/>
+                  <a16:creationId xmlns:a16="http://schemas.microsoft.com/office/drawing/2014/main" id="{A9B831F9-66DB-E8DE-5846-A5DEFF996D02}"/>
                 </a:ext>
               </a:extLst>
             </p:cNvPr>
@@ -6659,10 +6607,10 @@
         </p:sp>
         <p:sp>
           <p:nvSpPr>
-            <p:cNvPr id="78" name="Freeform 181">
+            <p:cNvPr id="166" name="Freeform 181">
               <a:extLst>
                 <a:ext uri="{FF2B5EF4-FFF2-40B4-BE49-F238E27FC236}">
-                  <a16:creationId xmlns:a16="http://schemas.microsoft.com/office/drawing/2014/main" id="{0125158D-86F3-4CAE-94AA-FCA0CB5A0AFE}"/>
+                  <a16:creationId xmlns:a16="http://schemas.microsoft.com/office/drawing/2014/main" id="{610A7B77-6DE5-F88D-37C2-7E3A5EEE3AF3}"/>
                 </a:ext>
               </a:extLst>
             </p:cNvPr>
@@ -6859,10 +6807,10 @@
         </p:sp>
         <p:sp>
           <p:nvSpPr>
-            <p:cNvPr id="81" name="Freeform 182">
+            <p:cNvPr id="167" name="Freeform 182">
               <a:extLst>
                 <a:ext uri="{FF2B5EF4-FFF2-40B4-BE49-F238E27FC236}">
-                  <a16:creationId xmlns:a16="http://schemas.microsoft.com/office/drawing/2014/main" id="{7C0FC3E6-00BA-471E-9BBC-17441D6A4F81}"/>
+                  <a16:creationId xmlns:a16="http://schemas.microsoft.com/office/drawing/2014/main" id="{ED2D3C92-3CB0-7B05-2046-D11AC18CA5CB}"/>
                 </a:ext>
               </a:extLst>
             </p:cNvPr>
@@ -7059,10 +7007,10 @@
         </p:sp>
         <p:sp>
           <p:nvSpPr>
-            <p:cNvPr id="82" name="Freeform 183">
+            <p:cNvPr id="168" name="Freeform 183">
               <a:extLst>
                 <a:ext uri="{FF2B5EF4-FFF2-40B4-BE49-F238E27FC236}">
-                  <a16:creationId xmlns:a16="http://schemas.microsoft.com/office/drawing/2014/main" id="{97C0AF6A-96F4-4FE8-9CA3-9F68AF5DF41B}"/>
+                  <a16:creationId xmlns:a16="http://schemas.microsoft.com/office/drawing/2014/main" id="{D42F0CF5-66B4-C7B8-7756-A3B28CE5AED1}"/>
                 </a:ext>
               </a:extLst>
             </p:cNvPr>
@@ -7300,10 +7248,10 @@
       </p:grpSp>
       <p:grpSp>
         <p:nvGrpSpPr>
-          <p:cNvPr id="102" name="Group 101">
+          <p:cNvPr id="169" name="Group 168">
             <a:extLst>
               <a:ext uri="{FF2B5EF4-FFF2-40B4-BE49-F238E27FC236}">
-                <a16:creationId xmlns:a16="http://schemas.microsoft.com/office/drawing/2014/main" id="{09329CD3-623F-490B-92F6-25D0F008C9F2}"/>
+                <a16:creationId xmlns:a16="http://schemas.microsoft.com/office/drawing/2014/main" id="{46C6D1B3-43E9-F807-A28B-4C16E19DB25A}"/>
               </a:ext>
             </a:extLst>
           </p:cNvPr>
@@ -7318,18 +7266,19 @@
             <a:chExt cx="350520" cy="320040"/>
           </a:xfrm>
           <a:solidFill>
-            <a:schemeClr val="bg1">
-              <a:lumMod val="75000"/>
+            <a:schemeClr val="accent5">
+              <a:lumMod val="40000"/>
+              <a:lumOff val="60000"/>
               <a:alpha val="45000"/>
             </a:schemeClr>
           </a:solidFill>
         </p:grpSpPr>
         <p:sp>
           <p:nvSpPr>
-            <p:cNvPr id="103" name="Freeform 18">
+            <p:cNvPr id="170" name="Freeform 18">
               <a:extLst>
                 <a:ext uri="{FF2B5EF4-FFF2-40B4-BE49-F238E27FC236}">
-                  <a16:creationId xmlns:a16="http://schemas.microsoft.com/office/drawing/2014/main" id="{F926C205-30DF-430A-91DF-73731E4296BC}"/>
+                  <a16:creationId xmlns:a16="http://schemas.microsoft.com/office/drawing/2014/main" id="{5B9A87C8-EBB6-4B40-1A23-A2A31906702E}"/>
                 </a:ext>
               </a:extLst>
             </p:cNvPr>
@@ -7601,7 +7550,12 @@
             </a:custGeom>
             <a:grpFill/>
             <a:ln w="9525" cap="flat">
-              <a:noFill/>
+              <a:solidFill>
+                <a:schemeClr val="accent5">
+                  <a:lumMod val="40000"/>
+                  <a:lumOff val="60000"/>
+                </a:schemeClr>
+              </a:solidFill>
               <a:prstDash val="solid"/>
               <a:miter/>
             </a:ln>
@@ -7646,10 +7600,10 @@
         </p:sp>
         <p:sp>
           <p:nvSpPr>
-            <p:cNvPr id="104" name="Freeform 19">
+            <p:cNvPr id="171" name="Freeform 19">
               <a:extLst>
                 <a:ext uri="{FF2B5EF4-FFF2-40B4-BE49-F238E27FC236}">
-                  <a16:creationId xmlns:a16="http://schemas.microsoft.com/office/drawing/2014/main" id="{2523B221-101A-4563-BBA6-5BD8835948A8}"/>
+                  <a16:creationId xmlns:a16="http://schemas.microsoft.com/office/drawing/2014/main" id="{703A71D3-3133-2588-DAC2-CF57E8CDC2EC}"/>
                 </a:ext>
               </a:extLst>
             </p:cNvPr>
@@ -7725,7 +7679,12 @@
             </a:custGeom>
             <a:grpFill/>
             <a:ln w="9525" cap="flat">
-              <a:noFill/>
+              <a:solidFill>
+                <a:schemeClr val="accent5">
+                  <a:lumMod val="40000"/>
+                  <a:lumOff val="60000"/>
+                </a:schemeClr>
+              </a:solidFill>
               <a:prstDash val="solid"/>
               <a:miter/>
             </a:ln>
@@ -7770,10 +7729,10 @@
         </p:sp>
         <p:sp>
           <p:nvSpPr>
-            <p:cNvPr id="105" name="Freeform 20">
+            <p:cNvPr id="172" name="Freeform 20">
               <a:extLst>
                 <a:ext uri="{FF2B5EF4-FFF2-40B4-BE49-F238E27FC236}">
-                  <a16:creationId xmlns:a16="http://schemas.microsoft.com/office/drawing/2014/main" id="{9DD172A8-DCD6-4CBF-A19D-DD145F49D702}"/>
+                  <a16:creationId xmlns:a16="http://schemas.microsoft.com/office/drawing/2014/main" id="{E72A330E-BBFC-929E-6C60-CD7F1D32B303}"/>
                 </a:ext>
               </a:extLst>
             </p:cNvPr>
@@ -7849,7 +7808,12 @@
             </a:custGeom>
             <a:grpFill/>
             <a:ln w="9525" cap="flat">
-              <a:noFill/>
+              <a:solidFill>
+                <a:schemeClr val="accent5">
+                  <a:lumMod val="40000"/>
+                  <a:lumOff val="60000"/>
+                </a:schemeClr>
+              </a:solidFill>
               <a:prstDash val="solid"/>
               <a:miter/>
             </a:ln>
@@ -7894,10 +7858,10 @@
         </p:sp>
         <p:sp>
           <p:nvSpPr>
-            <p:cNvPr id="106" name="Freeform 21">
+            <p:cNvPr id="173" name="Freeform 21">
               <a:extLst>
                 <a:ext uri="{FF2B5EF4-FFF2-40B4-BE49-F238E27FC236}">
-                  <a16:creationId xmlns:a16="http://schemas.microsoft.com/office/drawing/2014/main" id="{4214BCB5-1074-4E42-BAC1-076F7D5D0911}"/>
+                  <a16:creationId xmlns:a16="http://schemas.microsoft.com/office/drawing/2014/main" id="{E953A01B-8543-563C-071C-E59038157541}"/>
                 </a:ext>
               </a:extLst>
             </p:cNvPr>
@@ -7973,7 +7937,12 @@
             </a:custGeom>
             <a:grpFill/>
             <a:ln w="9525" cap="flat">
-              <a:noFill/>
+              <a:solidFill>
+                <a:schemeClr val="accent5">
+                  <a:lumMod val="40000"/>
+                  <a:lumOff val="60000"/>
+                </a:schemeClr>
+              </a:solidFill>
               <a:prstDash val="solid"/>
               <a:miter/>
             </a:ln>
@@ -8018,10 +7987,10 @@
         </p:sp>
         <p:sp>
           <p:nvSpPr>
-            <p:cNvPr id="107" name="Freeform 22">
+            <p:cNvPr id="174" name="Freeform 22">
               <a:extLst>
                 <a:ext uri="{FF2B5EF4-FFF2-40B4-BE49-F238E27FC236}">
-                  <a16:creationId xmlns:a16="http://schemas.microsoft.com/office/drawing/2014/main" id="{D630AB31-4D4C-4292-A8A4-5B13385BF620}"/>
+                  <a16:creationId xmlns:a16="http://schemas.microsoft.com/office/drawing/2014/main" id="{3E30D516-85BB-E701-5E27-11539F01E2CA}"/>
                 </a:ext>
               </a:extLst>
             </p:cNvPr>
@@ -8097,7 +8066,12 @@
             </a:custGeom>
             <a:grpFill/>
             <a:ln w="9525" cap="flat">
-              <a:noFill/>
+              <a:solidFill>
+                <a:schemeClr val="accent5">
+                  <a:lumMod val="40000"/>
+                  <a:lumOff val="60000"/>
+                </a:schemeClr>
+              </a:solidFill>
               <a:prstDash val="solid"/>
               <a:miter/>
             </a:ln>
@@ -8142,10 +8116,10 @@
         </p:sp>
         <p:sp>
           <p:nvSpPr>
-            <p:cNvPr id="108" name="Freeform 23">
+            <p:cNvPr id="175" name="Freeform 23">
               <a:extLst>
                 <a:ext uri="{FF2B5EF4-FFF2-40B4-BE49-F238E27FC236}">
-                  <a16:creationId xmlns:a16="http://schemas.microsoft.com/office/drawing/2014/main" id="{63EA89C4-1EAD-4AE6-B792-611522E1F175}"/>
+                  <a16:creationId xmlns:a16="http://schemas.microsoft.com/office/drawing/2014/main" id="{4A590DA1-7C91-F4BA-0D14-58DE28FC7342}"/>
                 </a:ext>
               </a:extLst>
             </p:cNvPr>
@@ -8221,7 +8195,12 @@
             </a:custGeom>
             <a:grpFill/>
             <a:ln w="9525" cap="flat">
-              <a:noFill/>
+              <a:solidFill>
+                <a:schemeClr val="accent5">
+                  <a:lumMod val="40000"/>
+                  <a:lumOff val="60000"/>
+                </a:schemeClr>
+              </a:solidFill>
               <a:prstDash val="solid"/>
               <a:miter/>
             </a:ln>
@@ -8266,10 +8245,10 @@
         </p:sp>
         <p:sp>
           <p:nvSpPr>
-            <p:cNvPr id="109" name="Freeform 24">
+            <p:cNvPr id="176" name="Freeform 24">
               <a:extLst>
                 <a:ext uri="{FF2B5EF4-FFF2-40B4-BE49-F238E27FC236}">
-                  <a16:creationId xmlns:a16="http://schemas.microsoft.com/office/drawing/2014/main" id="{AC3EA7EE-4BA9-4656-B11A-638DCBA9B5F1}"/>
+                  <a16:creationId xmlns:a16="http://schemas.microsoft.com/office/drawing/2014/main" id="{58C7C76F-345F-B5D4-3FAB-C62463DFEED0}"/>
                 </a:ext>
               </a:extLst>
             </p:cNvPr>
@@ -8345,7 +8324,12 @@
             </a:custGeom>
             <a:grpFill/>
             <a:ln w="9525" cap="flat">
-              <a:noFill/>
+              <a:solidFill>
+                <a:schemeClr val="accent5">
+                  <a:lumMod val="40000"/>
+                  <a:lumOff val="60000"/>
+                </a:schemeClr>
+              </a:solidFill>
               <a:prstDash val="solid"/>
               <a:miter/>
             </a:ln>
@@ -8390,10 +8374,10 @@
         </p:sp>
         <p:sp>
           <p:nvSpPr>
-            <p:cNvPr id="110" name="Freeform 25">
+            <p:cNvPr id="177" name="Freeform 25">
               <a:extLst>
                 <a:ext uri="{FF2B5EF4-FFF2-40B4-BE49-F238E27FC236}">
-                  <a16:creationId xmlns:a16="http://schemas.microsoft.com/office/drawing/2014/main" id="{16048490-3277-45C3-AD3E-E71F0B66079E}"/>
+                  <a16:creationId xmlns:a16="http://schemas.microsoft.com/office/drawing/2014/main" id="{6F6DA3A7-A247-617A-2FB1-332CDFF69455}"/>
                 </a:ext>
               </a:extLst>
             </p:cNvPr>
@@ -8469,7 +8453,12 @@
             </a:custGeom>
             <a:grpFill/>
             <a:ln w="9525" cap="flat">
-              <a:noFill/>
+              <a:solidFill>
+                <a:schemeClr val="accent5">
+                  <a:lumMod val="40000"/>
+                  <a:lumOff val="60000"/>
+                </a:schemeClr>
+              </a:solidFill>
               <a:prstDash val="solid"/>
               <a:miter/>
             </a:ln>
@@ -8514,10 +8503,10 @@
         </p:sp>
         <p:sp>
           <p:nvSpPr>
-            <p:cNvPr id="111" name="Freeform 26">
+            <p:cNvPr id="178" name="Freeform 26">
               <a:extLst>
                 <a:ext uri="{FF2B5EF4-FFF2-40B4-BE49-F238E27FC236}">
-                  <a16:creationId xmlns:a16="http://schemas.microsoft.com/office/drawing/2014/main" id="{2BBF77A5-42F1-46FE-BDB8-928855E96EAE}"/>
+                  <a16:creationId xmlns:a16="http://schemas.microsoft.com/office/drawing/2014/main" id="{92580478-C76E-32F2-ED48-8E0BA5666CAA}"/>
                 </a:ext>
               </a:extLst>
             </p:cNvPr>
@@ -8593,7 +8582,12 @@
             </a:custGeom>
             <a:grpFill/>
             <a:ln w="9525" cap="flat">
-              <a:noFill/>
+              <a:solidFill>
+                <a:schemeClr val="accent5">
+                  <a:lumMod val="40000"/>
+                  <a:lumOff val="60000"/>
+                </a:schemeClr>
+              </a:solidFill>
               <a:prstDash val="solid"/>
               <a:miter/>
             </a:ln>
@@ -8638,10 +8632,10 @@
         </p:sp>
         <p:sp>
           <p:nvSpPr>
-            <p:cNvPr id="112" name="Freeform 27">
+            <p:cNvPr id="179" name="Freeform 27">
               <a:extLst>
                 <a:ext uri="{FF2B5EF4-FFF2-40B4-BE49-F238E27FC236}">
-                  <a16:creationId xmlns:a16="http://schemas.microsoft.com/office/drawing/2014/main" id="{99839D03-9BD1-4E11-BB3C-C892B809C4E5}"/>
+                  <a16:creationId xmlns:a16="http://schemas.microsoft.com/office/drawing/2014/main" id="{4BEB9CE3-2921-750F-B821-B5D7EE3DA78F}"/>
                 </a:ext>
               </a:extLst>
             </p:cNvPr>
@@ -8717,7 +8711,12 @@
             </a:custGeom>
             <a:grpFill/>
             <a:ln w="9525" cap="flat">
-              <a:noFill/>
+              <a:solidFill>
+                <a:schemeClr val="accent5">
+                  <a:lumMod val="40000"/>
+                  <a:lumOff val="60000"/>
+                </a:schemeClr>
+              </a:solidFill>
               <a:prstDash val="solid"/>
               <a:miter/>
             </a:ln>
@@ -8762,10 +8761,10 @@
         </p:sp>
         <p:sp>
           <p:nvSpPr>
-            <p:cNvPr id="113" name="Freeform 28">
+            <p:cNvPr id="180" name="Freeform 28">
               <a:extLst>
                 <a:ext uri="{FF2B5EF4-FFF2-40B4-BE49-F238E27FC236}">
-                  <a16:creationId xmlns:a16="http://schemas.microsoft.com/office/drawing/2014/main" id="{0F545E33-62C7-4113-8BE2-A70D9D4DC518}"/>
+                  <a16:creationId xmlns:a16="http://schemas.microsoft.com/office/drawing/2014/main" id="{C3D9B59B-E1BD-40E4-5520-7C002E811A54}"/>
                 </a:ext>
               </a:extLst>
             </p:cNvPr>
@@ -8841,7 +8840,12 @@
             </a:custGeom>
             <a:grpFill/>
             <a:ln w="9525" cap="flat">
-              <a:noFill/>
+              <a:solidFill>
+                <a:schemeClr val="accent5">
+                  <a:lumMod val="40000"/>
+                  <a:lumOff val="60000"/>
+                </a:schemeClr>
+              </a:solidFill>
               <a:prstDash val="solid"/>
               <a:miter/>
             </a:ln>
@@ -8886,10 +8890,10 @@
         </p:sp>
         <p:sp>
           <p:nvSpPr>
-            <p:cNvPr id="114" name="Freeform 29">
+            <p:cNvPr id="181" name="Freeform 29">
               <a:extLst>
                 <a:ext uri="{FF2B5EF4-FFF2-40B4-BE49-F238E27FC236}">
-                  <a16:creationId xmlns:a16="http://schemas.microsoft.com/office/drawing/2014/main" id="{A05E96CB-A50D-4A89-ADC3-014386C33BFC}"/>
+                  <a16:creationId xmlns:a16="http://schemas.microsoft.com/office/drawing/2014/main" id="{0080AED4-B020-FEBF-B607-C477067EA4E4}"/>
                 </a:ext>
               </a:extLst>
             </p:cNvPr>
@@ -8965,7 +8969,12 @@
             </a:custGeom>
             <a:grpFill/>
             <a:ln w="9525" cap="flat">
-              <a:noFill/>
+              <a:solidFill>
+                <a:schemeClr val="accent5">
+                  <a:lumMod val="40000"/>
+                  <a:lumOff val="60000"/>
+                </a:schemeClr>
+              </a:solidFill>
               <a:prstDash val="solid"/>
               <a:miter/>
             </a:ln>
@@ -9010,10 +9019,10 @@
         </p:sp>
         <p:sp>
           <p:nvSpPr>
-            <p:cNvPr id="115" name="Freeform 30">
+            <p:cNvPr id="182" name="Freeform 30">
               <a:extLst>
                 <a:ext uri="{FF2B5EF4-FFF2-40B4-BE49-F238E27FC236}">
-                  <a16:creationId xmlns:a16="http://schemas.microsoft.com/office/drawing/2014/main" id="{C1D6BF86-102B-4B33-A591-BC58B91E69F0}"/>
+                  <a16:creationId xmlns:a16="http://schemas.microsoft.com/office/drawing/2014/main" id="{42632BB2-BB58-9A72-67AB-1D81A2A7F0FC}"/>
                 </a:ext>
               </a:extLst>
             </p:cNvPr>
@@ -9089,7 +9098,12 @@
             </a:custGeom>
             <a:grpFill/>
             <a:ln w="9525" cap="flat">
-              <a:noFill/>
+              <a:solidFill>
+                <a:schemeClr val="accent5">
+                  <a:lumMod val="40000"/>
+                  <a:lumOff val="60000"/>
+                </a:schemeClr>
+              </a:solidFill>
               <a:prstDash val="solid"/>
               <a:miter/>
             </a:ln>
@@ -9135,10 +9149,10 @@
       </p:grpSp>
       <p:sp>
         <p:nvSpPr>
-          <p:cNvPr id="83" name="TextBox 82">
+          <p:cNvPr id="183" name="TextBox 182">
             <a:extLst>
               <a:ext uri="{FF2B5EF4-FFF2-40B4-BE49-F238E27FC236}">
-                <a16:creationId xmlns:a16="http://schemas.microsoft.com/office/drawing/2014/main" id="{93F553F1-29BA-444B-8E29-436D059FD352}"/>
+                <a16:creationId xmlns:a16="http://schemas.microsoft.com/office/drawing/2014/main" id="{80C1BE94-9B48-4A96-6F2B-3FF9DA20D988}"/>
               </a:ext>
             </a:extLst>
           </p:cNvPr>
@@ -9178,10 +9192,10 @@
       </p:sp>
       <p:sp>
         <p:nvSpPr>
-          <p:cNvPr id="85" name="TextBox 84">
+          <p:cNvPr id="184" name="TextBox 183">
             <a:extLst>
               <a:ext uri="{FF2B5EF4-FFF2-40B4-BE49-F238E27FC236}">
-                <a16:creationId xmlns:a16="http://schemas.microsoft.com/office/drawing/2014/main" id="{1AB065DD-DD18-4E28-8734-98AA9F579FB7}"/>
+                <a16:creationId xmlns:a16="http://schemas.microsoft.com/office/drawing/2014/main" id="{4B723377-FB0C-8C58-0462-CD5CF8CC29B6}"/>
               </a:ext>
             </a:extLst>
           </p:cNvPr>
@@ -9217,10 +9231,10 @@
       </p:sp>
       <p:sp>
         <p:nvSpPr>
-          <p:cNvPr id="101" name="Freeform 35">
+          <p:cNvPr id="185" name="Freeform 35">
             <a:extLst>
               <a:ext uri="{FF2B5EF4-FFF2-40B4-BE49-F238E27FC236}">
-                <a16:creationId xmlns:a16="http://schemas.microsoft.com/office/drawing/2014/main" id="{1F4D9ED6-AE46-456C-BD6C-10293A770772}"/>
+                <a16:creationId xmlns:a16="http://schemas.microsoft.com/office/drawing/2014/main" id="{2C7F2A86-2119-2A55-EB4A-ADC8653E5E39}"/>
               </a:ext>
             </a:extLst>
           </p:cNvPr>
@@ -9603,10 +9617,10 @@
       </p:sp>
       <p:sp>
         <p:nvSpPr>
-          <p:cNvPr id="86" name="Rectangle 85">
+          <p:cNvPr id="186" name="Rectangle 185">
             <a:extLst>
               <a:ext uri="{FF2B5EF4-FFF2-40B4-BE49-F238E27FC236}">
-                <a16:creationId xmlns:a16="http://schemas.microsoft.com/office/drawing/2014/main" id="{0BEE7D0D-4206-443E-A085-2981BB68B100}"/>
+                <a16:creationId xmlns:a16="http://schemas.microsoft.com/office/drawing/2014/main" id="{FF386488-7152-05AC-3A35-7C14E5C7460B}"/>
               </a:ext>
             </a:extLst>
           </p:cNvPr>
@@ -9655,10 +9669,10 @@
       </p:sp>
       <p:sp>
         <p:nvSpPr>
-          <p:cNvPr id="116" name="Rectangle: Rounded Corners 115">
+          <p:cNvPr id="187" name="Rectangle: Rounded Corners 186">
             <a:extLst>
               <a:ext uri="{FF2B5EF4-FFF2-40B4-BE49-F238E27FC236}">
-                <a16:creationId xmlns:a16="http://schemas.microsoft.com/office/drawing/2014/main" id="{773472A8-C595-4579-B0ED-0425CF6759E5}"/>
+                <a16:creationId xmlns:a16="http://schemas.microsoft.com/office/drawing/2014/main" id="{CC4182F9-2F72-E685-2DE4-84CA7858ADB3}"/>
               </a:ext>
             </a:extLst>
           </p:cNvPr>
@@ -9712,10 +9726,10 @@
       </p:sp>
       <p:sp>
         <p:nvSpPr>
-          <p:cNvPr id="117" name="TextBox 116">
+          <p:cNvPr id="188" name="TextBox 187">
             <a:extLst>
               <a:ext uri="{FF2B5EF4-FFF2-40B4-BE49-F238E27FC236}">
-                <a16:creationId xmlns:a16="http://schemas.microsoft.com/office/drawing/2014/main" id="{A2AA2D72-1AB7-4327-A863-E2F7BCC97B30}"/>
+                <a16:creationId xmlns:a16="http://schemas.microsoft.com/office/drawing/2014/main" id="{45767809-725E-8238-0B13-4CE401B7CA7D}"/>
               </a:ext>
             </a:extLst>
           </p:cNvPr>
@@ -9747,10 +9761,10 @@
       </p:sp>
       <p:sp>
         <p:nvSpPr>
-          <p:cNvPr id="119" name="TextBox 118">
+          <p:cNvPr id="189" name="TextBox 188">
             <a:extLst>
               <a:ext uri="{FF2B5EF4-FFF2-40B4-BE49-F238E27FC236}">
-                <a16:creationId xmlns:a16="http://schemas.microsoft.com/office/drawing/2014/main" id="{44612EAC-B964-4EA4-9A57-CB04BB08350E}"/>
+                <a16:creationId xmlns:a16="http://schemas.microsoft.com/office/drawing/2014/main" id="{FFB2765E-DADF-2193-AB25-870A009092A5}"/>
               </a:ext>
             </a:extLst>
           </p:cNvPr>
@@ -9782,10 +9796,10 @@
       </p:sp>
       <p:sp>
         <p:nvSpPr>
-          <p:cNvPr id="118" name="TextBox 117">
+          <p:cNvPr id="190" name="TextBox 189">
             <a:extLst>
               <a:ext uri="{FF2B5EF4-FFF2-40B4-BE49-F238E27FC236}">
-                <a16:creationId xmlns:a16="http://schemas.microsoft.com/office/drawing/2014/main" id="{B32F52DE-A2B7-4A30-9861-EF506F0BE50B}"/>
+                <a16:creationId xmlns:a16="http://schemas.microsoft.com/office/drawing/2014/main" id="{F4F3B417-FCF8-922A-F524-F64B3B507482}"/>
               </a:ext>
             </a:extLst>
           </p:cNvPr>
@@ -9832,10 +9846,10 @@
       </p:sp>
       <p:sp>
         <p:nvSpPr>
-          <p:cNvPr id="120" name="TextBox 119">
+          <p:cNvPr id="191" name="TextBox 190">
             <a:extLst>
               <a:ext uri="{FF2B5EF4-FFF2-40B4-BE49-F238E27FC236}">
-                <a16:creationId xmlns:a16="http://schemas.microsoft.com/office/drawing/2014/main" id="{860CC882-3370-4280-AAC2-9A2E2DB0441A}"/>
+                <a16:creationId xmlns:a16="http://schemas.microsoft.com/office/drawing/2014/main" id="{DE2E0C33-9436-4BCA-45B3-CCBBD2ED215A}"/>
               </a:ext>
             </a:extLst>
           </p:cNvPr>
@@ -9882,10 +9896,10 @@
       </p:sp>
       <p:sp>
         <p:nvSpPr>
-          <p:cNvPr id="121" name="Freeform 35">
+          <p:cNvPr id="192" name="Freeform 35">
             <a:extLst>
               <a:ext uri="{FF2B5EF4-FFF2-40B4-BE49-F238E27FC236}">
-                <a16:creationId xmlns:a16="http://schemas.microsoft.com/office/drawing/2014/main" id="{9E3088BB-A0D8-416A-A2A6-A1606784D21B}"/>
+                <a16:creationId xmlns:a16="http://schemas.microsoft.com/office/drawing/2014/main" id="{97408797-11EF-67CF-FCE3-5EC56F355EF2}"/>
               </a:ext>
             </a:extLst>
           </p:cNvPr>
@@ -10271,10 +10285,10 @@
       </p:sp>
       <p:sp>
         <p:nvSpPr>
-          <p:cNvPr id="95" name="Rounded Rectangle 6">
+          <p:cNvPr id="193" name="Rounded Rectangle 6">
             <a:extLst>
               <a:ext uri="{FF2B5EF4-FFF2-40B4-BE49-F238E27FC236}">
-                <a16:creationId xmlns:a16="http://schemas.microsoft.com/office/drawing/2014/main" id="{07855AD8-4C8C-4361-9128-06C0E91F5575}"/>
+                <a16:creationId xmlns:a16="http://schemas.microsoft.com/office/drawing/2014/main" id="{440A8630-99CD-418D-A607-47D4A0624F49}"/>
               </a:ext>
             </a:extLst>
           </p:cNvPr>
@@ -10327,10 +10341,10 @@
       </p:sp>
       <p:sp>
         <p:nvSpPr>
-          <p:cNvPr id="96" name="TextBox 95">
+          <p:cNvPr id="194" name="TextBox 193">
             <a:extLst>
               <a:ext uri="{FF2B5EF4-FFF2-40B4-BE49-F238E27FC236}">
-                <a16:creationId xmlns:a16="http://schemas.microsoft.com/office/drawing/2014/main" id="{1131D7B5-7637-4280-9AFC-4FF61DD67763}"/>
+                <a16:creationId xmlns:a16="http://schemas.microsoft.com/office/drawing/2014/main" id="{F8290F32-F86A-D7BD-847C-312396F98530}"/>
               </a:ext>
             </a:extLst>
           </p:cNvPr>
@@ -10366,10 +10380,10 @@
       </p:sp>
       <p:sp>
         <p:nvSpPr>
-          <p:cNvPr id="97" name="Rectangle 96">
+          <p:cNvPr id="195" name="Rectangle 194">
             <a:extLst>
               <a:ext uri="{FF2B5EF4-FFF2-40B4-BE49-F238E27FC236}">
-                <a16:creationId xmlns:a16="http://schemas.microsoft.com/office/drawing/2014/main" id="{82EA81D0-F640-48DE-83BE-AE624F5BB7B6}"/>
+                <a16:creationId xmlns:a16="http://schemas.microsoft.com/office/drawing/2014/main" id="{9B1AE7E5-D81B-CD3D-1CE3-703D50EEABE4}"/>
               </a:ext>
             </a:extLst>
           </p:cNvPr>
@@ -10418,10 +10432,10 @@
       </p:sp>
       <p:sp>
         <p:nvSpPr>
-          <p:cNvPr id="98" name="Rectangle: Rounded Corners 97">
+          <p:cNvPr id="196" name="Rectangle: Rounded Corners 195">
             <a:extLst>
               <a:ext uri="{FF2B5EF4-FFF2-40B4-BE49-F238E27FC236}">
-                <a16:creationId xmlns:a16="http://schemas.microsoft.com/office/drawing/2014/main" id="{4C52569C-FC8C-4289-9026-DA9A731C0960}"/>
+                <a16:creationId xmlns:a16="http://schemas.microsoft.com/office/drawing/2014/main" id="{4B19A82A-653F-70CF-1D48-E4F9B1D349ED}"/>
               </a:ext>
             </a:extLst>
           </p:cNvPr>
@@ -10475,10 +10489,10 @@
       </p:sp>
       <p:sp>
         <p:nvSpPr>
-          <p:cNvPr id="122" name="TextBox 121">
+          <p:cNvPr id="197" name="TextBox 196">
             <a:extLst>
               <a:ext uri="{FF2B5EF4-FFF2-40B4-BE49-F238E27FC236}">
-                <a16:creationId xmlns:a16="http://schemas.microsoft.com/office/drawing/2014/main" id="{FA5F330A-2D04-4C14-853E-9C31378B5B63}"/>
+                <a16:creationId xmlns:a16="http://schemas.microsoft.com/office/drawing/2014/main" id="{7269C9EA-DEB6-0C8A-FF95-DE0EC152DAE3}"/>
               </a:ext>
             </a:extLst>
           </p:cNvPr>
@@ -10530,10 +10544,10 @@
       </p:sp>
       <p:sp>
         <p:nvSpPr>
-          <p:cNvPr id="131" name="Freeform 166">
+          <p:cNvPr id="198" name="Freeform 166">
             <a:extLst>
               <a:ext uri="{FF2B5EF4-FFF2-40B4-BE49-F238E27FC236}">
-                <a16:creationId xmlns:a16="http://schemas.microsoft.com/office/drawing/2014/main" id="{55B77F21-E611-4353-9BA2-9935C7C66A2F}"/>
+                <a16:creationId xmlns:a16="http://schemas.microsoft.com/office/drawing/2014/main" id="{DEF2FF01-9750-9171-560F-1194E149D1AA}"/>
               </a:ext>
             </a:extLst>
           </p:cNvPr>
@@ -11165,10 +11179,10 @@
       </p:sp>
       <p:sp>
         <p:nvSpPr>
-          <p:cNvPr id="132" name="TextBox 131">
+          <p:cNvPr id="199" name="TextBox 198">
             <a:extLst>
               <a:ext uri="{FF2B5EF4-FFF2-40B4-BE49-F238E27FC236}">
-                <a16:creationId xmlns:a16="http://schemas.microsoft.com/office/drawing/2014/main" id="{86C3B50B-32E2-4DBF-B8C6-A55832D6685A}"/>
+                <a16:creationId xmlns:a16="http://schemas.microsoft.com/office/drawing/2014/main" id="{E34498FA-763A-EEA5-0049-5B3E529D3754}"/>
               </a:ext>
             </a:extLst>
           </p:cNvPr>
@@ -11207,10 +11221,10 @@
       </p:sp>
       <p:sp>
         <p:nvSpPr>
-          <p:cNvPr id="90" name="TextBox 89">
+          <p:cNvPr id="200" name="TextBox 199">
             <a:extLst>
               <a:ext uri="{FF2B5EF4-FFF2-40B4-BE49-F238E27FC236}">
-                <a16:creationId xmlns:a16="http://schemas.microsoft.com/office/drawing/2014/main" id="{B4038997-2C89-4408-A84E-D8F30FD435B7}"/>
+                <a16:creationId xmlns:a16="http://schemas.microsoft.com/office/drawing/2014/main" id="{7BB0B401-5E42-E9B2-805D-666E40BC7B01}"/>
               </a:ext>
             </a:extLst>
           </p:cNvPr>
@@ -11219,7 +11233,7 @@
         </p:nvSpPr>
         <p:spPr>
           <a:xfrm>
-            <a:off x="6538499" y="1464281"/>
+            <a:off x="6511797" y="1464281"/>
             <a:ext cx="4311252" cy="169277"/>
           </a:xfrm>
           <a:prstGeom prst="rect">
@@ -11257,10 +11271,10 @@
       </p:sp>
       <p:sp>
         <p:nvSpPr>
-          <p:cNvPr id="92" name="TextBox 91">
+          <p:cNvPr id="201" name="TextBox 200">
             <a:extLst>
               <a:ext uri="{FF2B5EF4-FFF2-40B4-BE49-F238E27FC236}">
-                <a16:creationId xmlns:a16="http://schemas.microsoft.com/office/drawing/2014/main" id="{05C9BBE1-1CEE-4596-A56E-EDD649031959}"/>
+                <a16:creationId xmlns:a16="http://schemas.microsoft.com/office/drawing/2014/main" id="{EB6F9CD2-F1E8-6B8D-2BEE-5DC3BA432B2B}"/>
               </a:ext>
             </a:extLst>
           </p:cNvPr>
@@ -11269,7 +11283,7 @@
         </p:nvSpPr>
         <p:spPr>
           <a:xfrm>
-            <a:off x="6525746" y="1694727"/>
+            <a:off x="6499044" y="1694727"/>
             <a:ext cx="4311252" cy="169277"/>
           </a:xfrm>
           <a:prstGeom prst="rect">
@@ -11307,10 +11321,10 @@
       </p:sp>
       <p:sp>
         <p:nvSpPr>
-          <p:cNvPr id="94" name="TextBox 93">
+          <p:cNvPr id="202" name="TextBox 201">
             <a:extLst>
               <a:ext uri="{FF2B5EF4-FFF2-40B4-BE49-F238E27FC236}">
-                <a16:creationId xmlns:a16="http://schemas.microsoft.com/office/drawing/2014/main" id="{319D8A66-F0EA-4E8F-AA13-63EC083E5732}"/>
+                <a16:creationId xmlns:a16="http://schemas.microsoft.com/office/drawing/2014/main" id="{C2342E18-9F32-12DE-CC94-AACD135996EA}"/>
               </a:ext>
             </a:extLst>
           </p:cNvPr>
@@ -11319,7 +11333,7 @@
         </p:nvSpPr>
         <p:spPr>
           <a:xfrm>
-            <a:off x="6521393" y="1928684"/>
+            <a:off x="6494691" y="1928684"/>
             <a:ext cx="4311252" cy="184666"/>
           </a:xfrm>
           <a:prstGeom prst="rect">
@@ -11357,10 +11371,10 @@
       </p:sp>
       <p:sp>
         <p:nvSpPr>
-          <p:cNvPr id="75" name="TextBox 74">
+          <p:cNvPr id="203" name="TextBox 202">
             <a:extLst>
               <a:ext uri="{FF2B5EF4-FFF2-40B4-BE49-F238E27FC236}">
-                <a16:creationId xmlns:a16="http://schemas.microsoft.com/office/drawing/2014/main" id="{A3F8E0F3-AD7D-4DBB-A366-65ECD64BF3B0}"/>
+                <a16:creationId xmlns:a16="http://schemas.microsoft.com/office/drawing/2014/main" id="{879D47C0-CCE5-9DD0-D6B1-4CF8C408033A}"/>
               </a:ext>
             </a:extLst>
           </p:cNvPr>
@@ -11369,7 +11383,7 @@
         </p:nvSpPr>
         <p:spPr>
           <a:xfrm>
-            <a:off x="6513773" y="2389694"/>
+            <a:off x="6487071" y="2389694"/>
             <a:ext cx="4311252" cy="184666"/>
           </a:xfrm>
           <a:prstGeom prst="rect">
@@ -11407,10 +11421,10 @@
       </p:sp>
       <p:sp>
         <p:nvSpPr>
-          <p:cNvPr id="80" name="TextBox 79">
+          <p:cNvPr id="204" name="TextBox 203">
             <a:extLst>
               <a:ext uri="{FF2B5EF4-FFF2-40B4-BE49-F238E27FC236}">
-                <a16:creationId xmlns:a16="http://schemas.microsoft.com/office/drawing/2014/main" id="{E2A83592-0BF0-4640-A083-20A2004056CE}"/>
+                <a16:creationId xmlns:a16="http://schemas.microsoft.com/office/drawing/2014/main" id="{F8377507-E985-E0B4-F9F4-2C4C6024D588}"/>
               </a:ext>
             </a:extLst>
           </p:cNvPr>
@@ -11419,7 +11433,7 @@
         </p:nvSpPr>
         <p:spPr>
           <a:xfrm>
-            <a:off x="6517078" y="2634303"/>
+            <a:off x="6490376" y="2634303"/>
             <a:ext cx="4311252" cy="184666"/>
           </a:xfrm>
           <a:prstGeom prst="rect">
@@ -11457,10 +11471,10 @@
       </p:sp>
       <p:sp>
         <p:nvSpPr>
-          <p:cNvPr id="84" name="TextBox 83">
+          <p:cNvPr id="205" name="TextBox 204">
             <a:extLst>
               <a:ext uri="{FF2B5EF4-FFF2-40B4-BE49-F238E27FC236}">
-                <a16:creationId xmlns:a16="http://schemas.microsoft.com/office/drawing/2014/main" id="{09C20783-1255-4887-846D-EC2CE6547E1E}"/>
+                <a16:creationId xmlns:a16="http://schemas.microsoft.com/office/drawing/2014/main" id="{8E678365-CA9C-9194-4D00-890DA911A2C3}"/>
               </a:ext>
             </a:extLst>
           </p:cNvPr>
@@ -11469,7 +11483,7 @@
         </p:nvSpPr>
         <p:spPr>
           <a:xfrm>
-            <a:off x="6521393" y="2151043"/>
+            <a:off x="6494691" y="2151043"/>
             <a:ext cx="4311252" cy="184666"/>
           </a:xfrm>
           <a:prstGeom prst="rect">
@@ -11505,10 +11519,124 @@
           </a:p>
         </p:txBody>
       </p:sp>
+      <p:sp>
+        <p:nvSpPr>
+          <p:cNvPr id="4" name="TextBox 3">
+            <a:extLst>
+              <a:ext uri="{FF2B5EF4-FFF2-40B4-BE49-F238E27FC236}">
+                <a16:creationId xmlns:a16="http://schemas.microsoft.com/office/drawing/2014/main" id="{F8C8C5AC-1E27-2D65-45F6-3FCB46FCDEAC}"/>
+              </a:ext>
+            </a:extLst>
+          </p:cNvPr>
+          <p:cNvSpPr txBox="1"/>
+          <p:nvPr/>
+        </p:nvSpPr>
+        <p:spPr>
+          <a:xfrm>
+            <a:off x="1481721" y="2616042"/>
+            <a:ext cx="2837631" cy="705451"/>
+          </a:xfrm>
+          <a:prstGeom prst="rect">
+            <a:avLst/>
+          </a:prstGeom>
+          <a:noFill/>
+        </p:spPr>
+        <p:txBody>
+          <a:bodyPr wrap="square" lIns="0" tIns="0" rIns="0" bIns="0" rtlCol="0">
+            <a:noAutofit/>
+          </a:bodyPr>
+          <a:lstStyle/>
+          <a:p>
+            <a:pPr algn="l">
+              <a:spcAft>
+                <a:spcPts val="300"/>
+              </a:spcAft>
+            </a:pPr>
+            <a:r>
+              <a:rPr lang="en-GB" sz="1100" b="1" dirty="0"/>
+              <a:t>{{</a:t>
+            </a:r>
+            <a:r>
+              <a:rPr lang="en-GB" sz="1100" b="1" dirty="0" err="1"/>
+              <a:t>val:oap</a:t>
+            </a:r>
+            <a:r>
+              <a:rPr lang="en-GB" sz="1100" b="1" dirty="0"/>
+              <a:t>--query_counts.csv[1:15]}} Seconds</a:t>
+            </a:r>
+          </a:p>
+          <a:p>
+            <a:pPr algn="l">
+              <a:spcAft>
+                <a:spcPts val="600"/>
+              </a:spcAft>
+            </a:pPr>
+            <a:r>
+              <a:rPr lang="en-GB" sz="1100" b="1" dirty="0"/>
+              <a:t>{{</a:t>
+            </a:r>
+            <a:r>
+              <a:rPr lang="en-GB" sz="1100" b="1" dirty="0" err="1"/>
+              <a:t>val:oap</a:t>
+            </a:r>
+            <a:r>
+              <a:rPr lang="en-GB" sz="1100" b="1" dirty="0"/>
+              <a:t>--query_counts.csv[1:14]}}% Sub-Second</a:t>
+            </a:r>
+          </a:p>
+          <a:p>
+            <a:pPr algn="l">
+              <a:spcAft>
+                <a:spcPts val="600"/>
+              </a:spcAft>
+            </a:pPr>
+            <a:endParaRPr lang="en-GB" sz="1100" b="1" dirty="0"/>
+          </a:p>
+        </p:txBody>
+      </p:sp>
+      <p:pic>
+        <p:nvPicPr>
+          <p:cNvPr id="6" name="Graphic 5" descr="Hourglass 90% with solid fill">
+            <a:extLst>
+              <a:ext uri="{FF2B5EF4-FFF2-40B4-BE49-F238E27FC236}">
+                <a16:creationId xmlns:a16="http://schemas.microsoft.com/office/drawing/2014/main" id="{295C3261-57FF-EABA-0DB9-88901EF2F3D6}"/>
+              </a:ext>
+            </a:extLst>
+          </p:cNvPr>
+          <p:cNvPicPr>
+            <a:picLocks noChangeAspect="1"/>
+          </p:cNvPicPr>
+          <p:nvPr/>
+        </p:nvPicPr>
+        <p:blipFill>
+          <a:blip r:embed="rId7">
+            <a:extLst>
+              <a:ext uri="{28A0092B-C50C-407E-A947-70E740481C1C}">
+                <a14:useLocalDpi xmlns:a14="http://schemas.microsoft.com/office/drawing/2010/main" val="0"/>
+              </a:ext>
+              <a:ext uri="{96DAC541-7B7A-43D3-8B79-37D633B846F1}">
+                <asvg:svgBlip xmlns:asvg="http://schemas.microsoft.com/office/drawing/2016/SVG/main" r:embed="rId8"/>
+              </a:ext>
+            </a:extLst>
+          </a:blip>
+          <a:stretch>
+            <a:fillRect/>
+          </a:stretch>
+        </p:blipFill>
+        <p:spPr>
+          <a:xfrm>
+            <a:off x="721663" y="2552019"/>
+            <a:ext cx="530352" cy="530352"/>
+          </a:xfrm>
+          <a:prstGeom prst="rect">
+            <a:avLst/>
+          </a:prstGeom>
+        </p:spPr>
+      </p:pic>
     </p:spTree>
     <p:extLst>
       <p:ext uri="{BB962C8B-B14F-4D97-AF65-F5344CB8AC3E}">
-        <p14:creationId xmlns:p14="http://schemas.microsoft.com/office/powerpoint/2010/main" val="2838025867"/>
+        <p14:creationId xmlns:p14="http://schemas.microsoft.com/office/powerpoint/2010/main" val="2920393016"/>
       </p:ext>
     </p:extLst>
   </p:cSld>
@@ -12370,12 +12498,6 @@
 </file>
 
 <file path=customXml/item1.xml><?xml version="1.0" encoding="utf-8"?>
-<p:properties xmlns:p="http://schemas.microsoft.com/office/2006/metadata/properties" xmlns:xsi="http://www.w3.org/2001/XMLSchema-instance" xmlns:pc="http://schemas.microsoft.com/office/infopath/2007/PartnerControls">
-  <documentManagement/>
-</p:properties>
-</file>
-
-<file path=customXml/item2.xml><?xml version="1.0" encoding="utf-8"?>
 <?mso-contentType ?>
 <FormTemplates xmlns="http://schemas.microsoft.com/sharepoint/v3/contenttype/forms">
   <Display>DocumentLibraryForm</Display>
@@ -12384,7 +12506,7 @@
 </FormTemplates>
 </file>
 
-<file path=customXml/item3.xml><?xml version="1.0" encoding="utf-8"?>
+<file path=customXml/item2.xml><?xml version="1.0" encoding="utf-8"?>
 <ct:contentTypeSchema xmlns:ct="http://schemas.microsoft.com/office/2006/metadata/contentType" xmlns:ma="http://schemas.microsoft.com/office/2006/metadata/properties/metaAttributes" ct:_="" ma:_="" ma:contentTypeName="Document" ma:contentTypeID="0x0101002EB8E814A3F7584EAE8FF0B3DB852A19" ma:contentTypeVersion="9" ma:contentTypeDescription="Create a new document." ma:contentTypeScope="" ma:versionID="e69ab516aeb44ea5badcc8eb89028f65">
   <xsd:schema xmlns:xsd="http://www.w3.org/2001/XMLSchema" xmlns:xs="http://www.w3.org/2001/XMLSchema" xmlns:p="http://schemas.microsoft.com/office/2006/metadata/properties" xmlns:ns2="02124634-a52d-4e0c-b527-846138045ca7" xmlns:ns3="7d2247ee-dcae-49b5-8e6a-08fc19cc9b93" targetNamespace="http://schemas.microsoft.com/office/2006/metadata/properties" ma:root="true" ma:fieldsID="059e6346cdd3e15961f0c09961190cf6" ns2:_="" ns3:_="">
     <xsd:import namespace="02124634-a52d-4e0c-b527-846138045ca7"/>
@@ -12581,24 +12703,13 @@
 </ct:contentTypeSchema>
 </file>
 
-<file path=customXml/itemProps1.xml><?xml version="1.0" encoding="utf-8"?>
-<ds:datastoreItem xmlns:ds="http://schemas.openxmlformats.org/officeDocument/2006/customXml" ds:itemID="{6609DDB2-8F90-49F6-B87F-2D5D805E2FD6}">
-  <ds:schemaRefs>
-    <ds:schemaRef ds:uri="http://www.w3.org/XML/1998/namespace"/>
-    <ds:schemaRef ds:uri="http://purl.org/dc/terms/"/>
-    <ds:schemaRef ds:uri="http://schemas.microsoft.com/office/2006/metadata/properties"/>
-    <ds:schemaRef ds:uri="http://schemas.microsoft.com/office/2006/documentManagement/types"/>
-    <ds:schemaRef ds:uri="http://schemas.openxmlformats.org/package/2006/metadata/core-properties"/>
-    <ds:schemaRef ds:uri="http://schemas.microsoft.com/office/infopath/2007/PartnerControls"/>
-    <ds:schemaRef ds:uri="http://purl.org/dc/elements/1.1/"/>
-    <ds:schemaRef ds:uri="7d2247ee-dcae-49b5-8e6a-08fc19cc9b93"/>
-    <ds:schemaRef ds:uri="02124634-a52d-4e0c-b527-846138045ca7"/>
-    <ds:schemaRef ds:uri="http://purl.org/dc/dcmitype/"/>
-  </ds:schemaRefs>
-</ds:datastoreItem>
+<file path=customXml/item3.xml><?xml version="1.0" encoding="utf-8"?>
+<p:properties xmlns:p="http://schemas.microsoft.com/office/2006/metadata/properties" xmlns:xsi="http://www.w3.org/2001/XMLSchema-instance" xmlns:pc="http://schemas.microsoft.com/office/infopath/2007/PartnerControls">
+  <documentManagement/>
+</p:properties>
 </file>
 
-<file path=customXml/itemProps2.xml><?xml version="1.0" encoding="utf-8"?>
+<file path=customXml/itemProps1.xml><?xml version="1.0" encoding="utf-8"?>
 <ds:datastoreItem xmlns:ds="http://schemas.openxmlformats.org/officeDocument/2006/customXml" ds:itemID="{D278F648-E670-4262-A352-AA37A92B1414}">
   <ds:schemaRefs>
     <ds:schemaRef ds:uri="http://schemas.microsoft.com/sharepoint/v3/contenttype/forms"/>
@@ -12606,7 +12717,7 @@
 </ds:datastoreItem>
 </file>
 
-<file path=customXml/itemProps3.xml><?xml version="1.0" encoding="utf-8"?>
+<file path=customXml/itemProps2.xml><?xml version="1.0" encoding="utf-8"?>
 <ds:datastoreItem xmlns:ds="http://schemas.openxmlformats.org/officeDocument/2006/customXml" ds:itemID="{3B0D08CB-7837-46C6-8BCF-D192649CEE8A}">
   <ds:schemaRefs>
     <ds:schemaRef ds:uri="http://schemas.microsoft.com/office/2006/metadata/contentType"/>
@@ -12623,4 +12734,21 @@
     <ds:schemaRef ds:uri="http://schemas.microsoft.com/internal/obd"/>
   </ds:schemaRefs>
 </ds:datastoreItem>
+</file>
+
+<file path=customXml/itemProps3.xml><?xml version="1.0" encoding="utf-8"?>
+<ds:datastoreItem xmlns:ds="http://schemas.openxmlformats.org/officeDocument/2006/customXml" ds:itemID="{6609DDB2-8F90-49F6-B87F-2D5D805E2FD6}">
+  <ds:schemaRefs>
+    <ds:schemaRef ds:uri="http://www.w3.org/XML/1998/namespace"/>
+    <ds:schemaRef ds:uri="http://purl.org/dc/terms/"/>
+    <ds:schemaRef ds:uri="http://schemas.microsoft.com/office/2006/metadata/properties"/>
+    <ds:schemaRef ds:uri="http://schemas.microsoft.com/office/2006/documentManagement/types"/>
+    <ds:schemaRef ds:uri="http://schemas.openxmlformats.org/package/2006/metadata/core-properties"/>
+    <ds:schemaRef ds:uri="http://schemas.microsoft.com/office/infopath/2007/PartnerControls"/>
+    <ds:schemaRef ds:uri="http://purl.org/dc/elements/1.1/"/>
+    <ds:schemaRef ds:uri="7d2247ee-dcae-49b5-8e6a-08fc19cc9b93"/>
+    <ds:schemaRef ds:uri="02124634-a52d-4e0c-b527-846138045ca7"/>
+    <ds:schemaRef ds:uri="http://purl.org/dc/dcmitype/"/>
+  </ds:schemaRefs>
+</ds:datastoreItem>
 </file>
</xml_diff>